<commit_message>
changes- about the dataset added
</commit_message>
<xml_diff>
--- a/Minor Project presentation.pptx
+++ b/Minor Project presentation.pptx
@@ -20,22 +20,22 @@
     <p:sldId id="299" r:id="rId14"/>
     <p:sldId id="300" r:id="rId15"/>
     <p:sldId id="269" r:id="rId16"/>
-    <p:sldId id="267" r:id="rId17"/>
-    <p:sldId id="268" r:id="rId18"/>
-    <p:sldId id="271" r:id="rId19"/>
-    <p:sldId id="270" r:id="rId20"/>
-    <p:sldId id="272" r:id="rId21"/>
-    <p:sldId id="301" r:id="rId22"/>
-    <p:sldId id="273" r:id="rId23"/>
-    <p:sldId id="275" r:id="rId24"/>
-    <p:sldId id="276" r:id="rId25"/>
-    <p:sldId id="277" r:id="rId26"/>
-    <p:sldId id="278" r:id="rId27"/>
-    <p:sldId id="280" r:id="rId28"/>
-    <p:sldId id="281" r:id="rId29"/>
-    <p:sldId id="282" r:id="rId30"/>
-    <p:sldId id="279" r:id="rId31"/>
-    <p:sldId id="284" r:id="rId32"/>
+    <p:sldId id="307" r:id="rId17"/>
+    <p:sldId id="267" r:id="rId18"/>
+    <p:sldId id="268" r:id="rId19"/>
+    <p:sldId id="271" r:id="rId20"/>
+    <p:sldId id="270" r:id="rId21"/>
+    <p:sldId id="272" r:id="rId22"/>
+    <p:sldId id="301" r:id="rId23"/>
+    <p:sldId id="273" r:id="rId24"/>
+    <p:sldId id="275" r:id="rId25"/>
+    <p:sldId id="276" r:id="rId26"/>
+    <p:sldId id="277" r:id="rId27"/>
+    <p:sldId id="278" r:id="rId28"/>
+    <p:sldId id="280" r:id="rId29"/>
+    <p:sldId id="281" r:id="rId30"/>
+    <p:sldId id="282" r:id="rId31"/>
+    <p:sldId id="279" r:id="rId32"/>
     <p:sldId id="286" r:id="rId33"/>
     <p:sldId id="287" r:id="rId34"/>
     <p:sldId id="289" r:id="rId35"/>
@@ -308,7 +308,7 @@
           <a:p>
             <a:fld id="{20FD754C-4370-4621-9D47-182DEC24FB63}" type="datetimeFigureOut">
               <a:rPr lang="en-IN" smtClean="0"/>
-              <a:t>18-07-2020</a:t>
+              <a:t>19-07-2020</a:t>
             </a:fld>
             <a:endParaRPr lang="en-IN"/>
           </a:p>
@@ -508,7 +508,7 @@
           <a:p>
             <a:fld id="{20FD754C-4370-4621-9D47-182DEC24FB63}" type="datetimeFigureOut">
               <a:rPr lang="en-IN" smtClean="0"/>
-              <a:t>18-07-2020</a:t>
+              <a:t>19-07-2020</a:t>
             </a:fld>
             <a:endParaRPr lang="en-IN"/>
           </a:p>
@@ -718,7 +718,7 @@
           <a:p>
             <a:fld id="{20FD754C-4370-4621-9D47-182DEC24FB63}" type="datetimeFigureOut">
               <a:rPr lang="en-IN" smtClean="0"/>
-              <a:t>18-07-2020</a:t>
+              <a:t>19-07-2020</a:t>
             </a:fld>
             <a:endParaRPr lang="en-IN"/>
           </a:p>
@@ -918,7 +918,7 @@
           <a:p>
             <a:fld id="{20FD754C-4370-4621-9D47-182DEC24FB63}" type="datetimeFigureOut">
               <a:rPr lang="en-IN" smtClean="0"/>
-              <a:t>18-07-2020</a:t>
+              <a:t>19-07-2020</a:t>
             </a:fld>
             <a:endParaRPr lang="en-IN"/>
           </a:p>
@@ -1194,7 +1194,7 @@
           <a:p>
             <a:fld id="{20FD754C-4370-4621-9D47-182DEC24FB63}" type="datetimeFigureOut">
               <a:rPr lang="en-IN" smtClean="0"/>
-              <a:t>18-07-2020</a:t>
+              <a:t>19-07-2020</a:t>
             </a:fld>
             <a:endParaRPr lang="en-IN"/>
           </a:p>
@@ -1462,7 +1462,7 @@
           <a:p>
             <a:fld id="{20FD754C-4370-4621-9D47-182DEC24FB63}" type="datetimeFigureOut">
               <a:rPr lang="en-IN" smtClean="0"/>
-              <a:t>18-07-2020</a:t>
+              <a:t>19-07-2020</a:t>
             </a:fld>
             <a:endParaRPr lang="en-IN"/>
           </a:p>
@@ -1877,7 +1877,7 @@
           <a:p>
             <a:fld id="{20FD754C-4370-4621-9D47-182DEC24FB63}" type="datetimeFigureOut">
               <a:rPr lang="en-IN" smtClean="0"/>
-              <a:t>18-07-2020</a:t>
+              <a:t>19-07-2020</a:t>
             </a:fld>
             <a:endParaRPr lang="en-IN"/>
           </a:p>
@@ -2019,7 +2019,7 @@
           <a:p>
             <a:fld id="{20FD754C-4370-4621-9D47-182DEC24FB63}" type="datetimeFigureOut">
               <a:rPr lang="en-IN" smtClean="0"/>
-              <a:t>18-07-2020</a:t>
+              <a:t>19-07-2020</a:t>
             </a:fld>
             <a:endParaRPr lang="en-IN"/>
           </a:p>
@@ -2132,7 +2132,7 @@
           <a:p>
             <a:fld id="{20FD754C-4370-4621-9D47-182DEC24FB63}" type="datetimeFigureOut">
               <a:rPr lang="en-IN" smtClean="0"/>
-              <a:t>18-07-2020</a:t>
+              <a:t>19-07-2020</a:t>
             </a:fld>
             <a:endParaRPr lang="en-IN"/>
           </a:p>
@@ -2445,7 +2445,7 @@
           <a:p>
             <a:fld id="{20FD754C-4370-4621-9D47-182DEC24FB63}" type="datetimeFigureOut">
               <a:rPr lang="en-IN" smtClean="0"/>
-              <a:t>18-07-2020</a:t>
+              <a:t>19-07-2020</a:t>
             </a:fld>
             <a:endParaRPr lang="en-IN"/>
           </a:p>
@@ -2734,7 +2734,7 @@
           <a:p>
             <a:fld id="{20FD754C-4370-4621-9D47-182DEC24FB63}" type="datetimeFigureOut">
               <a:rPr lang="en-IN" smtClean="0"/>
-              <a:t>18-07-2020</a:t>
+              <a:t>19-07-2020</a:t>
             </a:fld>
             <a:endParaRPr lang="en-IN"/>
           </a:p>
@@ -3008,7 +3008,7 @@
           <a:p>
             <a:fld id="{20FD754C-4370-4621-9D47-182DEC24FB63}" type="datetimeFigureOut">
               <a:rPr lang="en-IN" smtClean="0"/>
-              <a:t>18-07-2020</a:t>
+              <a:t>19-07-2020</a:t>
             </a:fld>
             <a:endParaRPr lang="en-IN"/>
           </a:p>
@@ -4330,6 +4330,306 @@
           <p:cNvPr id="2" name="Title 1">
             <a:extLst>
               <a:ext uri="{FF2B5EF4-FFF2-40B4-BE49-F238E27FC236}">
+                <a16:creationId xmlns:a16="http://schemas.microsoft.com/office/drawing/2014/main" id="{417E3F44-1BAF-4EF1-804A-6C014308CEF9}"/>
+              </a:ext>
+            </a:extLst>
+          </p:cNvPr>
+          <p:cNvSpPr>
+            <a:spLocks noGrp="1"/>
+          </p:cNvSpPr>
+          <p:nvPr>
+            <p:ph type="title"/>
+          </p:nvPr>
+        </p:nvSpPr>
+        <p:spPr/>
+        <p:txBody>
+          <a:bodyPr/>
+          <a:lstStyle/>
+          <a:p>
+            <a:r>
+              <a:rPr lang="en-IN" dirty="0">
+                <a:solidFill>
+                  <a:srgbClr val="FF0000"/>
+                </a:solidFill>
+              </a:rPr>
+              <a:t>Question</a:t>
+            </a:r>
+          </a:p>
+        </p:txBody>
+      </p:sp>
+      <p:sp>
+        <p:nvSpPr>
+          <p:cNvPr id="3" name="Content Placeholder 2">
+            <a:extLst>
+              <a:ext uri="{FF2B5EF4-FFF2-40B4-BE49-F238E27FC236}">
+                <a16:creationId xmlns:a16="http://schemas.microsoft.com/office/drawing/2014/main" id="{2A276320-BA02-4217-BF48-28B6B274CF7F}"/>
+              </a:ext>
+            </a:extLst>
+          </p:cNvPr>
+          <p:cNvSpPr>
+            <a:spLocks noGrp="1"/>
+          </p:cNvSpPr>
+          <p:nvPr>
+            <p:ph idx="1"/>
+          </p:nvPr>
+        </p:nvSpPr>
+        <p:spPr>
+          <a:xfrm>
+            <a:off x="838200" y="1320656"/>
+            <a:ext cx="10515600" cy="5284859"/>
+          </a:xfrm>
+        </p:spPr>
+        <p:txBody>
+          <a:bodyPr>
+            <a:normAutofit/>
+          </a:bodyPr>
+          <a:lstStyle/>
+          <a:p>
+            <a:pPr marL="0" indent="0">
+              <a:buNone/>
+            </a:pPr>
+            <a:r>
+              <a:rPr lang="en-IN" sz="2400" dirty="0"/>
+              <a:t>Why 1999 KDD cup dataset is used?</a:t>
+            </a:r>
+          </a:p>
+          <a:p>
+            <a:pPr marL="0" indent="0">
+              <a:buNone/>
+            </a:pPr>
+            <a:endParaRPr lang="en-IN" sz="2400" dirty="0"/>
+          </a:p>
+          <a:p>
+            <a:pPr marL="0" indent="0">
+              <a:buNone/>
+            </a:pPr>
+            <a:r>
+              <a:rPr lang="en-IN" sz="2400" dirty="0"/>
+              <a:t>A study was conducted by professors of Jacobs University, Germany on the use of KDD99 dataset during 2010-2015</a:t>
+            </a:r>
+          </a:p>
+          <a:p>
+            <a:pPr marL="0" indent="0">
+              <a:buNone/>
+            </a:pPr>
+            <a:endParaRPr lang="en-IN" sz="3600" dirty="0"/>
+          </a:p>
+          <a:p>
+            <a:pPr marL="0" indent="0">
+              <a:buNone/>
+            </a:pPr>
+            <a:endParaRPr lang="en-IN" sz="3600" dirty="0"/>
+          </a:p>
+        </p:txBody>
+      </p:sp>
+      <p:pic>
+        <p:nvPicPr>
+          <p:cNvPr id="5" name="Picture 4">
+            <a:extLst>
+              <a:ext uri="{FF2B5EF4-FFF2-40B4-BE49-F238E27FC236}">
+                <a16:creationId xmlns:a16="http://schemas.microsoft.com/office/drawing/2014/main" id="{09E9FCA5-03F8-40F4-86A4-6386BF7BCF8E}"/>
+              </a:ext>
+            </a:extLst>
+          </p:cNvPr>
+          <p:cNvPicPr>
+            <a:picLocks noChangeAspect="1"/>
+          </p:cNvPicPr>
+          <p:nvPr/>
+        </p:nvPicPr>
+        <p:blipFill>
+          <a:blip r:embed="rId2"/>
+          <a:stretch>
+            <a:fillRect/>
+          </a:stretch>
+        </p:blipFill>
+        <p:spPr>
+          <a:xfrm>
+            <a:off x="224335" y="3395756"/>
+            <a:ext cx="3951880" cy="3097119"/>
+          </a:xfrm>
+          <a:prstGeom prst="rect">
+            <a:avLst/>
+          </a:prstGeom>
+        </p:spPr>
+      </p:pic>
+      <p:sp>
+        <p:nvSpPr>
+          <p:cNvPr id="6" name="TextBox 5">
+            <a:extLst>
+              <a:ext uri="{FF2B5EF4-FFF2-40B4-BE49-F238E27FC236}">
+                <a16:creationId xmlns:a16="http://schemas.microsoft.com/office/drawing/2014/main" id="{F1256258-A962-457A-9819-6227C6C7FB94}"/>
+              </a:ext>
+            </a:extLst>
+          </p:cNvPr>
+          <p:cNvSpPr txBox="1"/>
+          <p:nvPr/>
+        </p:nvSpPr>
+        <p:spPr>
+          <a:xfrm>
+            <a:off x="5813946" y="3712191"/>
+            <a:ext cx="184731" cy="369332"/>
+          </a:xfrm>
+          <a:prstGeom prst="rect">
+            <a:avLst/>
+          </a:prstGeom>
+          <a:noFill/>
+        </p:spPr>
+        <p:txBody>
+          <a:bodyPr wrap="none" rtlCol="0">
+            <a:spAutoFit/>
+          </a:bodyPr>
+          <a:lstStyle/>
+          <a:p>
+            <a:endParaRPr lang="en-IN" dirty="0"/>
+          </a:p>
+        </p:txBody>
+      </p:sp>
+      <p:sp>
+        <p:nvSpPr>
+          <p:cNvPr id="7" name="TextBox 6">
+            <a:extLst>
+              <a:ext uri="{FF2B5EF4-FFF2-40B4-BE49-F238E27FC236}">
+                <a16:creationId xmlns:a16="http://schemas.microsoft.com/office/drawing/2014/main" id="{007DB450-62C9-4FF7-83BA-BC063DEFCB43}"/>
+              </a:ext>
+            </a:extLst>
+          </p:cNvPr>
+          <p:cNvSpPr txBox="1"/>
+          <p:nvPr/>
+        </p:nvSpPr>
+        <p:spPr>
+          <a:xfrm>
+            <a:off x="4279350" y="3205377"/>
+            <a:ext cx="7831503" cy="3816429"/>
+          </a:xfrm>
+          <a:prstGeom prst="rect">
+            <a:avLst/>
+          </a:prstGeom>
+          <a:noFill/>
+        </p:spPr>
+        <p:txBody>
+          <a:bodyPr wrap="none" rtlCol="0">
+            <a:spAutoFit/>
+          </a:bodyPr>
+          <a:lstStyle/>
+          <a:p>
+            <a:pPr marL="342900" indent="-342900">
+              <a:buFont typeface="Arial" panose="020B0604020202020204" pitchFamily="34" charset="0"/>
+              <a:buChar char="•"/>
+            </a:pPr>
+            <a:r>
+              <a:rPr lang="en-IN" sz="2200" dirty="0"/>
+              <a:t>A total of 149 articles were published during this time period</a:t>
+            </a:r>
+          </a:p>
+          <a:p>
+            <a:r>
+              <a:rPr lang="en-IN" sz="2200" dirty="0"/>
+              <a:t>     which used this dataset.</a:t>
+            </a:r>
+          </a:p>
+          <a:p>
+            <a:pPr marL="342900" indent="-342900">
+              <a:buFont typeface="Arial" panose="020B0604020202020204" pitchFamily="34" charset="0"/>
+              <a:buChar char="•"/>
+            </a:pPr>
+            <a:endParaRPr lang="en-IN" sz="2200" dirty="0"/>
+          </a:p>
+          <a:p>
+            <a:pPr marL="342900" indent="-342900">
+              <a:buFont typeface="Arial" panose="020B0604020202020204" pitchFamily="34" charset="0"/>
+              <a:buChar char="•"/>
+            </a:pPr>
+            <a:r>
+              <a:rPr lang="en-IN" sz="2200" dirty="0"/>
+              <a:t>This shows the popularity of this dataset</a:t>
+            </a:r>
+          </a:p>
+          <a:p>
+            <a:pPr marL="342900" indent="-342900">
+              <a:buFont typeface="Arial" panose="020B0604020202020204" pitchFamily="34" charset="0"/>
+              <a:buChar char="•"/>
+            </a:pPr>
+            <a:endParaRPr lang="en-IN" sz="2200" dirty="0"/>
+          </a:p>
+          <a:p>
+            <a:pPr marL="342900" indent="-342900">
+              <a:buFont typeface="Arial" panose="020B0604020202020204" pitchFamily="34" charset="0"/>
+              <a:buChar char="•"/>
+            </a:pPr>
+            <a:r>
+              <a:rPr lang="en-IN" sz="2200" dirty="0"/>
+              <a:t>Even today, this the de facto dataset that is used in different</a:t>
+            </a:r>
+          </a:p>
+          <a:p>
+            <a:r>
+              <a:rPr lang="en-IN" sz="2200" dirty="0"/>
+              <a:t>      research works</a:t>
+            </a:r>
+          </a:p>
+          <a:p>
+            <a:pPr marL="342900" indent="-342900">
+              <a:buFont typeface="Arial" panose="020B0604020202020204" pitchFamily="34" charset="0"/>
+              <a:buChar char="•"/>
+            </a:pPr>
+            <a:endParaRPr lang="en-IN" sz="2200" dirty="0"/>
+          </a:p>
+          <a:p>
+            <a:pPr marL="342900" indent="-342900">
+              <a:buFont typeface="Arial" panose="020B0604020202020204" pitchFamily="34" charset="0"/>
+              <a:buChar char="•"/>
+            </a:pPr>
+            <a:r>
+              <a:rPr lang="en-IN" sz="2200" dirty="0"/>
+              <a:t>However latest datasets could have been used for our project, </a:t>
+            </a:r>
+          </a:p>
+          <a:p>
+            <a:r>
+              <a:rPr lang="en-IN" sz="2200" dirty="0"/>
+              <a:t>     we decided to stick with this dataset only.</a:t>
+            </a:r>
+          </a:p>
+          <a:p>
+            <a:endParaRPr lang="en-IN" sz="2200" dirty="0"/>
+          </a:p>
+        </p:txBody>
+      </p:sp>
+    </p:spTree>
+    <p:extLst>
+      <p:ext uri="{BB962C8B-B14F-4D97-AF65-F5344CB8AC3E}">
+        <p14:creationId xmlns:p14="http://schemas.microsoft.com/office/powerpoint/2010/main" val="3576528215"/>
+      </p:ext>
+    </p:extLst>
+  </p:cSld>
+  <p:clrMapOvr>
+    <a:masterClrMapping/>
+  </p:clrMapOvr>
+</p:sld>
+</file>
+
+<file path=ppt/slides/slide17.xml><?xml version="1.0" encoding="utf-8"?>
+<p:sld xmlns:a="http://schemas.openxmlformats.org/drawingml/2006/main" xmlns:r="http://schemas.openxmlformats.org/officeDocument/2006/relationships" xmlns:p="http://schemas.openxmlformats.org/presentationml/2006/main">
+  <p:cSld>
+    <p:spTree>
+      <p:nvGrpSpPr>
+        <p:cNvPr id="1" name=""/>
+        <p:cNvGrpSpPr/>
+        <p:nvPr/>
+      </p:nvGrpSpPr>
+      <p:grpSpPr>
+        <a:xfrm>
+          <a:off x="0" y="0"/>
+          <a:ext cx="0" cy="0"/>
+          <a:chOff x="0" y="0"/>
+          <a:chExt cx="0" cy="0"/>
+        </a:xfrm>
+      </p:grpSpPr>
+      <p:sp>
+        <p:nvSpPr>
+          <p:cNvPr id="2" name="Title 1">
+            <a:extLst>
+              <a:ext uri="{FF2B5EF4-FFF2-40B4-BE49-F238E27FC236}">
                 <a16:creationId xmlns:a16="http://schemas.microsoft.com/office/drawing/2014/main" id="{9C9F100F-1461-47AA-A44F-0ECDF4FA726F}"/>
               </a:ext>
             </a:extLst>
@@ -4431,7 +4731,7 @@
 </p:sld>
 </file>
 
-<file path=ppt/slides/slide17.xml><?xml version="1.0" encoding="utf-8"?>
+<file path=ppt/slides/slide18.xml><?xml version="1.0" encoding="utf-8"?>
 <p:sld xmlns:a="http://schemas.openxmlformats.org/drawingml/2006/main" xmlns:r="http://schemas.openxmlformats.org/officeDocument/2006/relationships" xmlns:p="http://schemas.openxmlformats.org/presentationml/2006/main">
   <p:cSld>
     <p:spTree>
@@ -4826,7 +5126,7 @@
 </p:sld>
 </file>
 
-<file path=ppt/slides/slide18.xml><?xml version="1.0" encoding="utf-8"?>
+<file path=ppt/slides/slide19.xml><?xml version="1.0" encoding="utf-8"?>
 <p:sld xmlns:a="http://schemas.openxmlformats.org/drawingml/2006/main" xmlns:r="http://schemas.openxmlformats.org/officeDocument/2006/relationships" xmlns:p="http://schemas.openxmlformats.org/presentationml/2006/main">
   <p:cSld>
     <p:spTree>
@@ -5299,304 +5599,6 @@
     <p:extLst>
       <p:ext uri="{BB962C8B-B14F-4D97-AF65-F5344CB8AC3E}">
         <p14:creationId xmlns:p14="http://schemas.microsoft.com/office/powerpoint/2010/main" val="439052592"/>
-      </p:ext>
-    </p:extLst>
-  </p:cSld>
-  <p:clrMapOvr>
-    <a:masterClrMapping/>
-  </p:clrMapOvr>
-</p:sld>
-</file>
-
-<file path=ppt/slides/slide19.xml><?xml version="1.0" encoding="utf-8"?>
-<p:sld xmlns:a="http://schemas.openxmlformats.org/drawingml/2006/main" xmlns:r="http://schemas.openxmlformats.org/officeDocument/2006/relationships" xmlns:p="http://schemas.openxmlformats.org/presentationml/2006/main">
-  <p:cSld>
-    <p:spTree>
-      <p:nvGrpSpPr>
-        <p:cNvPr id="1" name=""/>
-        <p:cNvGrpSpPr/>
-        <p:nvPr/>
-      </p:nvGrpSpPr>
-      <p:grpSpPr>
-        <a:xfrm>
-          <a:off x="0" y="0"/>
-          <a:ext cx="0" cy="0"/>
-          <a:chOff x="0" y="0"/>
-          <a:chExt cx="0" cy="0"/>
-        </a:xfrm>
-      </p:grpSpPr>
-      <p:sp>
-        <p:nvSpPr>
-          <p:cNvPr id="2" name="Title 1">
-            <a:extLst>
-              <a:ext uri="{FF2B5EF4-FFF2-40B4-BE49-F238E27FC236}">
-                <a16:creationId xmlns:a16="http://schemas.microsoft.com/office/drawing/2014/main" id="{53091BDE-9780-433C-9359-D52342D78B1E}"/>
-              </a:ext>
-            </a:extLst>
-          </p:cNvPr>
-          <p:cNvSpPr>
-            <a:spLocks noGrp="1"/>
-          </p:cNvSpPr>
-          <p:nvPr>
-            <p:ph type="title"/>
-          </p:nvPr>
-        </p:nvSpPr>
-        <p:spPr>
-          <a:xfrm>
-            <a:off x="838200" y="336989"/>
-            <a:ext cx="10515600" cy="1325563"/>
-          </a:xfrm>
-        </p:spPr>
-        <p:txBody>
-          <a:bodyPr/>
-          <a:lstStyle/>
-          <a:p>
-            <a:r>
-              <a:rPr lang="en-IN" dirty="0"/>
-              <a:t>Is our dataset ready yet?</a:t>
-            </a:r>
-          </a:p>
-        </p:txBody>
-      </p:sp>
-      <p:sp>
-        <p:nvSpPr>
-          <p:cNvPr id="3" name="Content Placeholder 2">
-            <a:extLst>
-              <a:ext uri="{FF2B5EF4-FFF2-40B4-BE49-F238E27FC236}">
-                <a16:creationId xmlns:a16="http://schemas.microsoft.com/office/drawing/2014/main" id="{59176F25-7A6C-4292-9682-75D6B907B014}"/>
-              </a:ext>
-            </a:extLst>
-          </p:cNvPr>
-          <p:cNvSpPr>
-            <a:spLocks noGrp="1"/>
-          </p:cNvSpPr>
-          <p:nvPr>
-            <p:ph idx="1"/>
-          </p:nvPr>
-        </p:nvSpPr>
-        <p:spPr>
-          <a:xfrm>
-            <a:off x="838200" y="1507573"/>
-            <a:ext cx="10515600" cy="4351338"/>
-          </a:xfrm>
-        </p:spPr>
-        <p:txBody>
-          <a:bodyPr/>
-          <a:lstStyle/>
-          <a:p>
-            <a:pPr marL="0" indent="0">
-              <a:buNone/>
-            </a:pPr>
-            <a:r>
-              <a:rPr lang="en-IN" dirty="0"/>
-              <a:t>Let’s have a look at out dataset once again</a:t>
-            </a:r>
-          </a:p>
-        </p:txBody>
-      </p:sp>
-      <p:pic>
-        <p:nvPicPr>
-          <p:cNvPr id="4" name="Picture 2" descr="The feature in KDD Cup'99 dataset [2]. | Download Table">
-            <a:extLst>
-              <a:ext uri="{FF2B5EF4-FFF2-40B4-BE49-F238E27FC236}">
-                <a16:creationId xmlns:a16="http://schemas.microsoft.com/office/drawing/2014/main" id="{AD01FEAB-BFC6-43B2-A9CC-8046A67C7D33}"/>
-              </a:ext>
-            </a:extLst>
-          </p:cNvPr>
-          <p:cNvPicPr>
-            <a:picLocks noChangeAspect="1" noChangeArrowheads="1"/>
-          </p:cNvPicPr>
-          <p:nvPr/>
-        </p:nvPicPr>
-        <p:blipFill>
-          <a:blip r:embed="rId2">
-            <a:extLst>
-              <a:ext uri="{28A0092B-C50C-407E-A947-70E740481C1C}">
-                <a14:useLocalDpi xmlns:a14="http://schemas.microsoft.com/office/drawing/2010/main" val="0"/>
-              </a:ext>
-            </a:extLst>
-          </a:blip>
-          <a:srcRect/>
-          <a:stretch>
-            <a:fillRect/>
-          </a:stretch>
-        </p:blipFill>
-        <p:spPr bwMode="auto">
-          <a:xfrm>
-            <a:off x="1961322" y="2109312"/>
-            <a:ext cx="6586330" cy="4694023"/>
-          </a:xfrm>
-          <a:prstGeom prst="rect">
-            <a:avLst/>
-          </a:prstGeom>
-          <a:noFill/>
-          <a:extLst>
-            <a:ext uri="{909E8E84-426E-40DD-AFC4-6F175D3DCCD1}">
-              <a14:hiddenFill xmlns:a14="http://schemas.microsoft.com/office/drawing/2010/main">
-                <a:solidFill>
-                  <a:srgbClr val="FFFFFF"/>
-                </a:solidFill>
-              </a14:hiddenFill>
-            </a:ext>
-          </a:extLst>
-        </p:spPr>
-      </p:pic>
-      <p:sp>
-        <p:nvSpPr>
-          <p:cNvPr id="5" name="Oval 4">
-            <a:extLst>
-              <a:ext uri="{FF2B5EF4-FFF2-40B4-BE49-F238E27FC236}">
-                <a16:creationId xmlns:a16="http://schemas.microsoft.com/office/drawing/2014/main" id="{6CBB6250-A09E-4EA1-B1B2-10381E0A5DF7}"/>
-              </a:ext>
-            </a:extLst>
-          </p:cNvPr>
-          <p:cNvSpPr/>
-          <p:nvPr/>
-        </p:nvSpPr>
-        <p:spPr>
-          <a:xfrm>
-            <a:off x="3882887" y="3429000"/>
-            <a:ext cx="1245704" cy="533400"/>
-          </a:xfrm>
-          <a:prstGeom prst="ellipse">
-            <a:avLst/>
-          </a:prstGeom>
-          <a:noFill/>
-          <a:ln w="57150"/>
-        </p:spPr>
-        <p:style>
-          <a:lnRef idx="2">
-            <a:schemeClr val="accent1">
-              <a:shade val="50000"/>
-            </a:schemeClr>
-          </a:lnRef>
-          <a:fillRef idx="1">
-            <a:schemeClr val="accent1"/>
-          </a:fillRef>
-          <a:effectRef idx="0">
-            <a:schemeClr val="accent1"/>
-          </a:effectRef>
-          <a:fontRef idx="minor">
-            <a:schemeClr val="lt1"/>
-          </a:fontRef>
-        </p:style>
-        <p:txBody>
-          <a:bodyPr rtlCol="0" anchor="ctr"/>
-          <a:lstStyle/>
-          <a:p>
-            <a:pPr algn="ctr"/>
-            <a:endParaRPr lang="en-IN"/>
-          </a:p>
-        </p:txBody>
-      </p:sp>
-      <p:sp>
-        <p:nvSpPr>
-          <p:cNvPr id="6" name="Oval 5">
-            <a:extLst>
-              <a:ext uri="{FF2B5EF4-FFF2-40B4-BE49-F238E27FC236}">
-                <a16:creationId xmlns:a16="http://schemas.microsoft.com/office/drawing/2014/main" id="{8BBC7ACB-73A7-456B-B83A-1FDF5BFFEE1D}"/>
-              </a:ext>
-            </a:extLst>
-          </p:cNvPr>
-          <p:cNvSpPr/>
-          <p:nvPr/>
-        </p:nvSpPr>
-        <p:spPr>
-          <a:xfrm>
-            <a:off x="3882887" y="4520329"/>
-            <a:ext cx="1245704" cy="533400"/>
-          </a:xfrm>
-          <a:prstGeom prst="ellipse">
-            <a:avLst/>
-          </a:prstGeom>
-          <a:noFill/>
-          <a:ln w="57150"/>
-        </p:spPr>
-        <p:style>
-          <a:lnRef idx="2">
-            <a:schemeClr val="accent1">
-              <a:shade val="50000"/>
-            </a:schemeClr>
-          </a:lnRef>
-          <a:fillRef idx="1">
-            <a:schemeClr val="accent1"/>
-          </a:fillRef>
-          <a:effectRef idx="0">
-            <a:schemeClr val="accent1"/>
-          </a:effectRef>
-          <a:fontRef idx="minor">
-            <a:schemeClr val="lt1"/>
-          </a:fontRef>
-        </p:style>
-        <p:txBody>
-          <a:bodyPr rtlCol="0" anchor="ctr"/>
-          <a:lstStyle/>
-          <a:p>
-            <a:pPr algn="ctr"/>
-            <a:endParaRPr lang="en-IN"/>
-          </a:p>
-        </p:txBody>
-      </p:sp>
-      <p:sp>
-        <p:nvSpPr>
-          <p:cNvPr id="7" name="TextBox 6">
-            <a:extLst>
-              <a:ext uri="{FF2B5EF4-FFF2-40B4-BE49-F238E27FC236}">
-                <a16:creationId xmlns:a16="http://schemas.microsoft.com/office/drawing/2014/main" id="{03F0D462-2A79-4C04-BFFC-1369B1BC0F6B}"/>
-              </a:ext>
-            </a:extLst>
-          </p:cNvPr>
-          <p:cNvSpPr txBox="1"/>
-          <p:nvPr/>
-        </p:nvSpPr>
-        <p:spPr>
-          <a:xfrm>
-            <a:off x="8930780" y="2483466"/>
-            <a:ext cx="3186834" cy="1631216"/>
-          </a:xfrm>
-          <a:prstGeom prst="rect">
-            <a:avLst/>
-          </a:prstGeom>
-          <a:noFill/>
-        </p:spPr>
-        <p:txBody>
-          <a:bodyPr wrap="none" rtlCol="0">
-            <a:spAutoFit/>
-          </a:bodyPr>
-          <a:lstStyle/>
-          <a:p>
-            <a:r>
-              <a:rPr lang="en-IN" sz="2000" b="1" dirty="0"/>
-              <a:t>There are mostly numeric </a:t>
-            </a:r>
-          </a:p>
-          <a:p>
-            <a:r>
-              <a:rPr lang="en-IN" sz="2000" b="1" dirty="0"/>
-              <a:t>or continuous features.</a:t>
-            </a:r>
-          </a:p>
-          <a:p>
-            <a:endParaRPr lang="en-IN" sz="2000" b="1" dirty="0"/>
-          </a:p>
-          <a:p>
-            <a:r>
-              <a:rPr lang="en-IN" sz="2000" b="1" dirty="0"/>
-              <a:t>But there are discrete or </a:t>
-            </a:r>
-          </a:p>
-          <a:p>
-            <a:r>
-              <a:rPr lang="en-IN" sz="2000" b="1" dirty="0"/>
-              <a:t>categorical features as well. </a:t>
-            </a:r>
-          </a:p>
-        </p:txBody>
-      </p:sp>
-    </p:spTree>
-    <p:extLst>
-      <p:ext uri="{BB962C8B-B14F-4D97-AF65-F5344CB8AC3E}">
-        <p14:creationId xmlns:p14="http://schemas.microsoft.com/office/powerpoint/2010/main" val="2132428047"/>
       </p:ext>
     </p:extLst>
   </p:cSld>
@@ -6161,7 +6163,12 @@
             <p:ph idx="1"/>
           </p:nvPr>
         </p:nvSpPr>
-        <p:spPr/>
+        <p:spPr>
+          <a:xfrm>
+            <a:off x="838200" y="1507573"/>
+            <a:ext cx="10515600" cy="4351338"/>
+          </a:xfrm>
+        </p:spPr>
         <p:txBody>
           <a:bodyPr/>
           <a:lstStyle/>
@@ -6171,13 +6178,300 @@
             </a:pPr>
             <a:r>
               <a:rPr lang="en-IN" dirty="0"/>
+              <a:t>Let’s have a look at out dataset once again</a:t>
+            </a:r>
+          </a:p>
+        </p:txBody>
+      </p:sp>
+      <p:pic>
+        <p:nvPicPr>
+          <p:cNvPr id="4" name="Picture 2" descr="The feature in KDD Cup'99 dataset [2]. | Download Table">
+            <a:extLst>
+              <a:ext uri="{FF2B5EF4-FFF2-40B4-BE49-F238E27FC236}">
+                <a16:creationId xmlns:a16="http://schemas.microsoft.com/office/drawing/2014/main" id="{AD01FEAB-BFC6-43B2-A9CC-8046A67C7D33}"/>
+              </a:ext>
+            </a:extLst>
+          </p:cNvPr>
+          <p:cNvPicPr>
+            <a:picLocks noChangeAspect="1" noChangeArrowheads="1"/>
+          </p:cNvPicPr>
+          <p:nvPr/>
+        </p:nvPicPr>
+        <p:blipFill>
+          <a:blip r:embed="rId2">
+            <a:extLst>
+              <a:ext uri="{28A0092B-C50C-407E-A947-70E740481C1C}">
+                <a14:useLocalDpi xmlns:a14="http://schemas.microsoft.com/office/drawing/2010/main" val="0"/>
+              </a:ext>
+            </a:extLst>
+          </a:blip>
+          <a:srcRect/>
+          <a:stretch>
+            <a:fillRect/>
+          </a:stretch>
+        </p:blipFill>
+        <p:spPr bwMode="auto">
+          <a:xfrm>
+            <a:off x="1961322" y="2109312"/>
+            <a:ext cx="6586330" cy="4694023"/>
+          </a:xfrm>
+          <a:prstGeom prst="rect">
+            <a:avLst/>
+          </a:prstGeom>
+          <a:noFill/>
+          <a:extLst>
+            <a:ext uri="{909E8E84-426E-40DD-AFC4-6F175D3DCCD1}">
+              <a14:hiddenFill xmlns:a14="http://schemas.microsoft.com/office/drawing/2010/main">
+                <a:solidFill>
+                  <a:srgbClr val="FFFFFF"/>
+                </a:solidFill>
+              </a14:hiddenFill>
+            </a:ext>
+          </a:extLst>
+        </p:spPr>
+      </p:pic>
+      <p:sp>
+        <p:nvSpPr>
+          <p:cNvPr id="5" name="Oval 4">
+            <a:extLst>
+              <a:ext uri="{FF2B5EF4-FFF2-40B4-BE49-F238E27FC236}">
+                <a16:creationId xmlns:a16="http://schemas.microsoft.com/office/drawing/2014/main" id="{6CBB6250-A09E-4EA1-B1B2-10381E0A5DF7}"/>
+              </a:ext>
+            </a:extLst>
+          </p:cNvPr>
+          <p:cNvSpPr/>
+          <p:nvPr/>
+        </p:nvSpPr>
+        <p:spPr>
+          <a:xfrm>
+            <a:off x="3882887" y="3429000"/>
+            <a:ext cx="1245704" cy="533400"/>
+          </a:xfrm>
+          <a:prstGeom prst="ellipse">
+            <a:avLst/>
+          </a:prstGeom>
+          <a:noFill/>
+          <a:ln w="57150"/>
+        </p:spPr>
+        <p:style>
+          <a:lnRef idx="2">
+            <a:schemeClr val="accent1">
+              <a:shade val="50000"/>
+            </a:schemeClr>
+          </a:lnRef>
+          <a:fillRef idx="1">
+            <a:schemeClr val="accent1"/>
+          </a:fillRef>
+          <a:effectRef idx="0">
+            <a:schemeClr val="accent1"/>
+          </a:effectRef>
+          <a:fontRef idx="minor">
+            <a:schemeClr val="lt1"/>
+          </a:fontRef>
+        </p:style>
+        <p:txBody>
+          <a:bodyPr rtlCol="0" anchor="ctr"/>
+          <a:lstStyle/>
+          <a:p>
+            <a:pPr algn="ctr"/>
+            <a:endParaRPr lang="en-IN"/>
+          </a:p>
+        </p:txBody>
+      </p:sp>
+      <p:sp>
+        <p:nvSpPr>
+          <p:cNvPr id="6" name="Oval 5">
+            <a:extLst>
+              <a:ext uri="{FF2B5EF4-FFF2-40B4-BE49-F238E27FC236}">
+                <a16:creationId xmlns:a16="http://schemas.microsoft.com/office/drawing/2014/main" id="{8BBC7ACB-73A7-456B-B83A-1FDF5BFFEE1D}"/>
+              </a:ext>
+            </a:extLst>
+          </p:cNvPr>
+          <p:cNvSpPr/>
+          <p:nvPr/>
+        </p:nvSpPr>
+        <p:spPr>
+          <a:xfrm>
+            <a:off x="3882887" y="4520329"/>
+            <a:ext cx="1245704" cy="533400"/>
+          </a:xfrm>
+          <a:prstGeom prst="ellipse">
+            <a:avLst/>
+          </a:prstGeom>
+          <a:noFill/>
+          <a:ln w="57150"/>
+        </p:spPr>
+        <p:style>
+          <a:lnRef idx="2">
+            <a:schemeClr val="accent1">
+              <a:shade val="50000"/>
+            </a:schemeClr>
+          </a:lnRef>
+          <a:fillRef idx="1">
+            <a:schemeClr val="accent1"/>
+          </a:fillRef>
+          <a:effectRef idx="0">
+            <a:schemeClr val="accent1"/>
+          </a:effectRef>
+          <a:fontRef idx="minor">
+            <a:schemeClr val="lt1"/>
+          </a:fontRef>
+        </p:style>
+        <p:txBody>
+          <a:bodyPr rtlCol="0" anchor="ctr"/>
+          <a:lstStyle/>
+          <a:p>
+            <a:pPr algn="ctr"/>
+            <a:endParaRPr lang="en-IN"/>
+          </a:p>
+        </p:txBody>
+      </p:sp>
+      <p:sp>
+        <p:nvSpPr>
+          <p:cNvPr id="7" name="TextBox 6">
+            <a:extLst>
+              <a:ext uri="{FF2B5EF4-FFF2-40B4-BE49-F238E27FC236}">
+                <a16:creationId xmlns:a16="http://schemas.microsoft.com/office/drawing/2014/main" id="{03F0D462-2A79-4C04-BFFC-1369B1BC0F6B}"/>
+              </a:ext>
+            </a:extLst>
+          </p:cNvPr>
+          <p:cNvSpPr txBox="1"/>
+          <p:nvPr/>
+        </p:nvSpPr>
+        <p:spPr>
+          <a:xfrm>
+            <a:off x="8930780" y="2483466"/>
+            <a:ext cx="3186834" cy="1631216"/>
+          </a:xfrm>
+          <a:prstGeom prst="rect">
+            <a:avLst/>
+          </a:prstGeom>
+          <a:noFill/>
+        </p:spPr>
+        <p:txBody>
+          <a:bodyPr wrap="none" rtlCol="0">
+            <a:spAutoFit/>
+          </a:bodyPr>
+          <a:lstStyle/>
+          <a:p>
+            <a:r>
+              <a:rPr lang="en-IN" sz="2000" b="1" dirty="0"/>
+              <a:t>There are mostly numeric </a:t>
+            </a:r>
+          </a:p>
+          <a:p>
+            <a:r>
+              <a:rPr lang="en-IN" sz="2000" b="1" dirty="0"/>
+              <a:t>or continuous features.</a:t>
+            </a:r>
+          </a:p>
+          <a:p>
+            <a:endParaRPr lang="en-IN" sz="2000" b="1" dirty="0"/>
+          </a:p>
+          <a:p>
+            <a:r>
+              <a:rPr lang="en-IN" sz="2000" b="1" dirty="0"/>
+              <a:t>But there are discrete or </a:t>
+            </a:r>
+          </a:p>
+          <a:p>
+            <a:r>
+              <a:rPr lang="en-IN" sz="2000" b="1" dirty="0"/>
+              <a:t>categorical features as well. </a:t>
+            </a:r>
+          </a:p>
+        </p:txBody>
+      </p:sp>
+    </p:spTree>
+    <p:extLst>
+      <p:ext uri="{BB962C8B-B14F-4D97-AF65-F5344CB8AC3E}">
+        <p14:creationId xmlns:p14="http://schemas.microsoft.com/office/powerpoint/2010/main" val="2132428047"/>
+      </p:ext>
+    </p:extLst>
+  </p:cSld>
+  <p:clrMapOvr>
+    <a:masterClrMapping/>
+  </p:clrMapOvr>
+</p:sld>
+</file>
+
+<file path=ppt/slides/slide21.xml><?xml version="1.0" encoding="utf-8"?>
+<p:sld xmlns:a="http://schemas.openxmlformats.org/drawingml/2006/main" xmlns:r="http://schemas.openxmlformats.org/officeDocument/2006/relationships" xmlns:p="http://schemas.openxmlformats.org/presentationml/2006/main">
+  <p:cSld>
+    <p:spTree>
+      <p:nvGrpSpPr>
+        <p:cNvPr id="1" name=""/>
+        <p:cNvGrpSpPr/>
+        <p:nvPr/>
+      </p:nvGrpSpPr>
+      <p:grpSpPr>
+        <a:xfrm>
+          <a:off x="0" y="0"/>
+          <a:ext cx="0" cy="0"/>
+          <a:chOff x="0" y="0"/>
+          <a:chExt cx="0" cy="0"/>
+        </a:xfrm>
+      </p:grpSpPr>
+      <p:sp>
+        <p:nvSpPr>
+          <p:cNvPr id="2" name="Title 1">
+            <a:extLst>
+              <a:ext uri="{FF2B5EF4-FFF2-40B4-BE49-F238E27FC236}">
+                <a16:creationId xmlns:a16="http://schemas.microsoft.com/office/drawing/2014/main" id="{53091BDE-9780-433C-9359-D52342D78B1E}"/>
+              </a:ext>
+            </a:extLst>
+          </p:cNvPr>
+          <p:cNvSpPr>
+            <a:spLocks noGrp="1"/>
+          </p:cNvSpPr>
+          <p:nvPr>
+            <p:ph type="title"/>
+          </p:nvPr>
+        </p:nvSpPr>
+        <p:spPr>
+          <a:xfrm>
+            <a:off x="838200" y="336989"/>
+            <a:ext cx="10515600" cy="1325563"/>
+          </a:xfrm>
+        </p:spPr>
+        <p:txBody>
+          <a:bodyPr/>
+          <a:lstStyle/>
+          <a:p>
+            <a:r>
+              <a:rPr lang="en-IN" dirty="0"/>
+              <a:t>Is our dataset ready yet?</a:t>
+            </a:r>
+          </a:p>
+        </p:txBody>
+      </p:sp>
+      <p:sp>
+        <p:nvSpPr>
+          <p:cNvPr id="3" name="Content Placeholder 2">
+            <a:extLst>
+              <a:ext uri="{FF2B5EF4-FFF2-40B4-BE49-F238E27FC236}">
+                <a16:creationId xmlns:a16="http://schemas.microsoft.com/office/drawing/2014/main" id="{59176F25-7A6C-4292-9682-75D6B907B014}"/>
+              </a:ext>
+            </a:extLst>
+          </p:cNvPr>
+          <p:cNvSpPr>
+            <a:spLocks noGrp="1"/>
+          </p:cNvSpPr>
+          <p:nvPr>
+            <p:ph idx="1"/>
+          </p:nvPr>
+        </p:nvSpPr>
+        <p:spPr/>
+        <p:txBody>
+          <a:bodyPr/>
+          <a:lstStyle/>
+          <a:p>
+            <a:r>
+              <a:rPr lang="en-IN" dirty="0"/>
               <a:t>Computers don’t understand text</a:t>
             </a:r>
           </a:p>
           <a:p>
-            <a:pPr marL="0" indent="0">
-              <a:buNone/>
-            </a:pPr>
             <a:r>
               <a:rPr lang="en-IN" dirty="0"/>
               <a:t>We need to come up with something that will convert discrete data to numeric data </a:t>
@@ -6324,7 +6618,7 @@
 </p:sld>
 </file>
 
-<file path=ppt/slides/slide21.xml><?xml version="1.0" encoding="utf-8"?>
+<file path=ppt/slides/slide22.xml><?xml version="1.0" encoding="utf-8"?>
 <p:sld xmlns:a="http://schemas.openxmlformats.org/drawingml/2006/main" xmlns:r="http://schemas.openxmlformats.org/officeDocument/2006/relationships" xmlns:p="http://schemas.openxmlformats.org/presentationml/2006/main">
   <p:cSld>
     <p:spTree>
@@ -6657,7 +6951,7 @@
         </p:nvSpPr>
         <p:spPr>
           <a:xfrm>
-            <a:off x="4797287" y="3803374"/>
+            <a:off x="4829591" y="3850918"/>
             <a:ext cx="2186608" cy="2186609"/>
           </a:xfrm>
           <a:prstGeom prst="rect">
@@ -6913,7 +7207,7 @@
 </p:sld>
 </file>
 
-<file path=ppt/slides/slide22.xml><?xml version="1.0" encoding="utf-8"?>
+<file path=ppt/slides/slide23.xml><?xml version="1.0" encoding="utf-8"?>
 <p:sld xmlns:a="http://schemas.openxmlformats.org/drawingml/2006/main" xmlns:r="http://schemas.openxmlformats.org/officeDocument/2006/relationships" xmlns:p="http://schemas.openxmlformats.org/presentationml/2006/main">
   <p:cSld>
     <p:spTree>
@@ -7227,7 +7521,7 @@
 </p:sld>
 </file>
 
-<file path=ppt/slides/slide23.xml><?xml version="1.0" encoding="utf-8"?>
+<file path=ppt/slides/slide24.xml><?xml version="1.0" encoding="utf-8"?>
 <p:sld xmlns:a="http://schemas.openxmlformats.org/drawingml/2006/main" xmlns:r="http://schemas.openxmlformats.org/officeDocument/2006/relationships" xmlns:p="http://schemas.openxmlformats.org/presentationml/2006/main">
   <p:cSld>
     <p:spTree>
@@ -7714,166 +8008,6 @@
 </p:sld>
 </file>
 
-<file path=ppt/slides/slide24.xml><?xml version="1.0" encoding="utf-8"?>
-<p:sld xmlns:a="http://schemas.openxmlformats.org/drawingml/2006/main" xmlns:r="http://schemas.openxmlformats.org/officeDocument/2006/relationships" xmlns:p="http://schemas.openxmlformats.org/presentationml/2006/main">
-  <p:cSld>
-    <p:spTree>
-      <p:nvGrpSpPr>
-        <p:cNvPr id="1" name=""/>
-        <p:cNvGrpSpPr/>
-        <p:nvPr/>
-      </p:nvGrpSpPr>
-      <p:grpSpPr>
-        <a:xfrm>
-          <a:off x="0" y="0"/>
-          <a:ext cx="0" cy="0"/>
-          <a:chOff x="0" y="0"/>
-          <a:chExt cx="0" cy="0"/>
-        </a:xfrm>
-      </p:grpSpPr>
-      <p:sp>
-        <p:nvSpPr>
-          <p:cNvPr id="2" name="Title 1">
-            <a:extLst>
-              <a:ext uri="{FF2B5EF4-FFF2-40B4-BE49-F238E27FC236}">
-                <a16:creationId xmlns:a16="http://schemas.microsoft.com/office/drawing/2014/main" id="{B3D9E838-FAE3-4485-BA30-1A76CCAEB458}"/>
-              </a:ext>
-            </a:extLst>
-          </p:cNvPr>
-          <p:cNvSpPr>
-            <a:spLocks noGrp="1"/>
-          </p:cNvSpPr>
-          <p:nvPr>
-            <p:ph type="title"/>
-          </p:nvPr>
-        </p:nvSpPr>
-        <p:spPr/>
-        <p:txBody>
-          <a:bodyPr/>
-          <a:lstStyle/>
-          <a:p>
-            <a:r>
-              <a:rPr lang="en-IN" dirty="0"/>
-              <a:t>Applying machine learning models</a:t>
-            </a:r>
-          </a:p>
-        </p:txBody>
-      </p:sp>
-      <p:sp>
-        <p:nvSpPr>
-          <p:cNvPr id="3" name="Content Placeholder 2">
-            <a:extLst>
-              <a:ext uri="{FF2B5EF4-FFF2-40B4-BE49-F238E27FC236}">
-                <a16:creationId xmlns:a16="http://schemas.microsoft.com/office/drawing/2014/main" id="{1CB1F33E-8319-41E6-A616-02C627972B16}"/>
-              </a:ext>
-            </a:extLst>
-          </p:cNvPr>
-          <p:cNvSpPr>
-            <a:spLocks noGrp="1"/>
-          </p:cNvSpPr>
-          <p:nvPr>
-            <p:ph idx="1"/>
-          </p:nvPr>
-        </p:nvSpPr>
-        <p:spPr/>
-        <p:txBody>
-          <a:bodyPr>
-            <a:normAutofit/>
-          </a:bodyPr>
-          <a:lstStyle/>
-          <a:p>
-            <a:pPr marL="0" indent="0">
-              <a:buNone/>
-            </a:pPr>
-            <a:r>
-              <a:rPr lang="en-IN" dirty="0"/>
-              <a:t>We have implemented 4 machine learning models in this project:</a:t>
-            </a:r>
-          </a:p>
-          <a:p>
-            <a:pPr marL="514350" indent="-514350">
-              <a:buAutoNum type="arabicParenR"/>
-            </a:pPr>
-            <a:r>
-              <a:rPr lang="en-IN" dirty="0"/>
-              <a:t>K- nearest neighbour</a:t>
-            </a:r>
-          </a:p>
-          <a:p>
-            <a:pPr marL="514350" indent="-514350">
-              <a:buAutoNum type="arabicParenR"/>
-            </a:pPr>
-            <a:r>
-              <a:rPr lang="en-IN" dirty="0"/>
-              <a:t>Naïve Bayes classifier</a:t>
-            </a:r>
-          </a:p>
-          <a:p>
-            <a:pPr marL="514350" indent="-514350">
-              <a:buAutoNum type="arabicParenR"/>
-            </a:pPr>
-            <a:r>
-              <a:rPr lang="en-IN" dirty="0"/>
-              <a:t>Logistic regression </a:t>
-            </a:r>
-          </a:p>
-          <a:p>
-            <a:pPr marL="514350" indent="-514350">
-              <a:buAutoNum type="arabicParenR"/>
-            </a:pPr>
-            <a:r>
-              <a:rPr lang="en-IN" dirty="0"/>
-              <a:t>Decision tree classifier</a:t>
-            </a:r>
-          </a:p>
-          <a:p>
-            <a:pPr marL="514350" indent="-514350">
-              <a:buAutoNum type="arabicParenR"/>
-            </a:pPr>
-            <a:endParaRPr lang="en-IN" dirty="0"/>
-          </a:p>
-          <a:p>
-            <a:pPr marL="0" indent="0">
-              <a:buNone/>
-            </a:pPr>
-            <a:r>
-              <a:rPr lang="en-IN" dirty="0"/>
-              <a:t>And the results of these models are then compared.</a:t>
-            </a:r>
-          </a:p>
-          <a:p>
-            <a:pPr marL="514350" indent="-514350">
-              <a:buAutoNum type="arabicParenR"/>
-            </a:pPr>
-            <a:endParaRPr lang="en-IN" dirty="0"/>
-          </a:p>
-          <a:p>
-            <a:pPr marL="0" indent="0">
-              <a:buNone/>
-            </a:pPr>
-            <a:endParaRPr lang="en-IN" dirty="0"/>
-          </a:p>
-          <a:p>
-            <a:pPr marL="514350" indent="-514350">
-              <a:buAutoNum type="arabicParenR"/>
-            </a:pPr>
-            <a:endParaRPr lang="en-IN" dirty="0"/>
-          </a:p>
-        </p:txBody>
-      </p:sp>
-    </p:spTree>
-    <p:extLst>
-      <p:ext uri="{BB962C8B-B14F-4D97-AF65-F5344CB8AC3E}">
-        <p14:creationId xmlns:p14="http://schemas.microsoft.com/office/powerpoint/2010/main" val="667608939"/>
-      </p:ext>
-    </p:extLst>
-  </p:cSld>
-  <p:clrMapOvr>
-    <a:masterClrMapping/>
-  </p:clrMapOvr>
-</p:sld>
-</file>
-
 <file path=ppt/slides/slide25.xml><?xml version="1.0" encoding="utf-8"?>
 <p:sld xmlns:a="http://schemas.openxmlformats.org/drawingml/2006/main" xmlns:r="http://schemas.openxmlformats.org/officeDocument/2006/relationships" xmlns:p="http://schemas.openxmlformats.org/presentationml/2006/main">
   <p:cSld>
@@ -7896,7 +8030,7 @@
           <p:cNvPr id="2" name="Title 1">
             <a:extLst>
               <a:ext uri="{FF2B5EF4-FFF2-40B4-BE49-F238E27FC236}">
-                <a16:creationId xmlns:a16="http://schemas.microsoft.com/office/drawing/2014/main" id="{72C6AD10-C612-4855-A954-070C08F5C879}"/>
+                <a16:creationId xmlns:a16="http://schemas.microsoft.com/office/drawing/2014/main" id="{B3D9E838-FAE3-4485-BA30-1A76CCAEB458}"/>
               </a:ext>
             </a:extLst>
           </p:cNvPr>
@@ -7914,7 +8048,7 @@
           <a:p>
             <a:r>
               <a:rPr lang="en-IN" dirty="0"/>
-              <a:t>K-nearest neighbour</a:t>
+              <a:t>Applying machine learning models</a:t>
             </a:r>
           </a:p>
         </p:txBody>
@@ -7924,7 +8058,7 @@
           <p:cNvPr id="3" name="Content Placeholder 2">
             <a:extLst>
               <a:ext uri="{FF2B5EF4-FFF2-40B4-BE49-F238E27FC236}">
-                <a16:creationId xmlns:a16="http://schemas.microsoft.com/office/drawing/2014/main" id="{77105D34-2C32-4A55-AE84-5EEAD7F8B98D}"/>
+                <a16:creationId xmlns:a16="http://schemas.microsoft.com/office/drawing/2014/main" id="{1CB1F33E-8319-41E6-A616-02C627972B16}"/>
               </a:ext>
             </a:extLst>
           </p:cNvPr>
@@ -7935,69 +8069,88 @@
             <p:ph idx="1"/>
           </p:nvPr>
         </p:nvSpPr>
-        <p:spPr>
-          <a:xfrm>
-            <a:off x="838199" y="1825624"/>
-            <a:ext cx="10992729" cy="4561107"/>
-          </a:xfrm>
-        </p:spPr>
+        <p:spPr/>
         <p:txBody>
           <a:bodyPr>
-            <a:normAutofit lnSpcReduction="10000"/>
+            <a:normAutofit/>
           </a:bodyPr>
           <a:lstStyle/>
           <a:p>
+            <a:pPr marL="0" indent="0">
+              <a:buNone/>
+            </a:pPr>
             <a:r>
               <a:rPr lang="en-IN" dirty="0"/>
-              <a:t>Simple model based on the principle that if two data points are close (here geometrically) , they are similar. </a:t>
-            </a:r>
-          </a:p>
-          <a:p>
+              <a:t>We have implemented 4 machine learning models in this project:</a:t>
+            </a:r>
+          </a:p>
+          <a:p>
+            <a:pPr marL="514350" indent="-514350">
+              <a:buAutoNum type="arabicParenR"/>
+            </a:pPr>
+            <a:r>
+              <a:rPr lang="en-IN" dirty="0"/>
+              <a:t>K- nearest neighbour</a:t>
+            </a:r>
+          </a:p>
+          <a:p>
+            <a:pPr marL="514350" indent="-514350">
+              <a:buAutoNum type="arabicParenR"/>
+            </a:pPr>
+            <a:r>
+              <a:rPr lang="en-IN" dirty="0"/>
+              <a:t>Naïve Bayes classifier</a:t>
+            </a:r>
+          </a:p>
+          <a:p>
+            <a:pPr marL="514350" indent="-514350">
+              <a:buAutoNum type="arabicParenR"/>
+            </a:pPr>
+            <a:r>
+              <a:rPr lang="en-IN" dirty="0"/>
+              <a:t>Logistic regression </a:t>
+            </a:r>
+          </a:p>
+          <a:p>
+            <a:pPr marL="514350" indent="-514350">
+              <a:buAutoNum type="arabicParenR"/>
+            </a:pPr>
+            <a:r>
+              <a:rPr lang="en-IN" dirty="0"/>
+              <a:t>Decision tree classifier</a:t>
+            </a:r>
+          </a:p>
+          <a:p>
+            <a:pPr marL="514350" indent="-514350">
+              <a:buAutoNum type="arabicParenR"/>
+            </a:pPr>
             <a:endParaRPr lang="en-IN" dirty="0"/>
           </a:p>
           <a:p>
+            <a:pPr marL="0" indent="0">
+              <a:buNone/>
+            </a:pPr>
             <a:r>
               <a:rPr lang="en-IN" dirty="0"/>
-              <a:t>Given a new data point for which we want to find the output, we find points that are distance-wise close to the concerned point. </a:t>
-            </a:r>
-          </a:p>
-          <a:p>
+              <a:t>And the results of these models are then compared.</a:t>
+            </a:r>
+          </a:p>
+          <a:p>
+            <a:pPr marL="514350" indent="-514350">
+              <a:buAutoNum type="arabicParenR"/>
+            </a:pPr>
             <a:endParaRPr lang="en-IN" dirty="0"/>
           </a:p>
           <a:p>
-            <a:r>
-              <a:rPr lang="en-IN" dirty="0"/>
-              <a:t>Whatever is the class label for </a:t>
-            </a:r>
-            <a:r>
-              <a:rPr lang="en-IN" dirty="0">
-                <a:solidFill>
-                  <a:srgbClr val="FF0000"/>
-                </a:solidFill>
-              </a:rPr>
-              <a:t>majority</a:t>
-            </a:r>
-            <a:r>
-              <a:rPr lang="en-IN" dirty="0"/>
-              <a:t> of points in that neighbourhood, that would be the class label for our new data point.</a:t>
-            </a:r>
-          </a:p>
-          <a:p>
+            <a:pPr marL="0" indent="0">
+              <a:buNone/>
+            </a:pPr>
             <a:endParaRPr lang="en-IN" dirty="0"/>
           </a:p>
           <a:p>
-            <a:r>
-              <a:rPr lang="en-IN" dirty="0"/>
-              <a:t>K value decides how many points should we take for neighbourhood</a:t>
-            </a:r>
-          </a:p>
-          <a:p>
-            <a:endParaRPr lang="en-IN" dirty="0"/>
-          </a:p>
-          <a:p>
-            <a:endParaRPr lang="en-IN" dirty="0"/>
-          </a:p>
-          <a:p>
+            <a:pPr marL="514350" indent="-514350">
+              <a:buAutoNum type="arabicParenR"/>
+            </a:pPr>
             <a:endParaRPr lang="en-IN" dirty="0"/>
           </a:p>
         </p:txBody>
@@ -8005,7 +8158,7 @@
     </p:spTree>
     <p:extLst>
       <p:ext uri="{BB962C8B-B14F-4D97-AF65-F5344CB8AC3E}">
-        <p14:creationId xmlns:p14="http://schemas.microsoft.com/office/powerpoint/2010/main" val="3870837968"/>
+        <p14:creationId xmlns:p14="http://schemas.microsoft.com/office/powerpoint/2010/main" val="667608939"/>
       </p:ext>
     </p:extLst>
   </p:cSld>
@@ -8078,6 +8231,147 @@
         </p:nvSpPr>
         <p:spPr>
           <a:xfrm>
+            <a:off x="838199" y="1825624"/>
+            <a:ext cx="10992729" cy="4561107"/>
+          </a:xfrm>
+        </p:spPr>
+        <p:txBody>
+          <a:bodyPr>
+            <a:normAutofit lnSpcReduction="10000"/>
+          </a:bodyPr>
+          <a:lstStyle/>
+          <a:p>
+            <a:r>
+              <a:rPr lang="en-IN" dirty="0"/>
+              <a:t>Simple model based on the principle that if two data points are close (here geometrically) , they are similar. </a:t>
+            </a:r>
+          </a:p>
+          <a:p>
+            <a:endParaRPr lang="en-IN" dirty="0"/>
+          </a:p>
+          <a:p>
+            <a:r>
+              <a:rPr lang="en-IN" dirty="0"/>
+              <a:t>Given a new data point for which we want to find the output, we find points that are distance-wise close to the concerned point. </a:t>
+            </a:r>
+          </a:p>
+          <a:p>
+            <a:endParaRPr lang="en-IN" dirty="0"/>
+          </a:p>
+          <a:p>
+            <a:r>
+              <a:rPr lang="en-IN" dirty="0"/>
+              <a:t>Whatever is the class label for </a:t>
+            </a:r>
+            <a:r>
+              <a:rPr lang="en-IN" dirty="0">
+                <a:solidFill>
+                  <a:srgbClr val="FF0000"/>
+                </a:solidFill>
+              </a:rPr>
+              <a:t>majority</a:t>
+            </a:r>
+            <a:r>
+              <a:rPr lang="en-IN" dirty="0"/>
+              <a:t> of points in that neighbourhood, that would be the class label for our new data point.</a:t>
+            </a:r>
+          </a:p>
+          <a:p>
+            <a:endParaRPr lang="en-IN" dirty="0"/>
+          </a:p>
+          <a:p>
+            <a:r>
+              <a:rPr lang="en-IN" dirty="0"/>
+              <a:t>K value decides how many points should we take for neighbourhood</a:t>
+            </a:r>
+          </a:p>
+          <a:p>
+            <a:endParaRPr lang="en-IN" dirty="0"/>
+          </a:p>
+          <a:p>
+            <a:endParaRPr lang="en-IN" dirty="0"/>
+          </a:p>
+          <a:p>
+            <a:endParaRPr lang="en-IN" dirty="0"/>
+          </a:p>
+        </p:txBody>
+      </p:sp>
+    </p:spTree>
+    <p:extLst>
+      <p:ext uri="{BB962C8B-B14F-4D97-AF65-F5344CB8AC3E}">
+        <p14:creationId xmlns:p14="http://schemas.microsoft.com/office/powerpoint/2010/main" val="3870837968"/>
+      </p:ext>
+    </p:extLst>
+  </p:cSld>
+  <p:clrMapOvr>
+    <a:masterClrMapping/>
+  </p:clrMapOvr>
+</p:sld>
+</file>
+
+<file path=ppt/slides/slide27.xml><?xml version="1.0" encoding="utf-8"?>
+<p:sld xmlns:a="http://schemas.openxmlformats.org/drawingml/2006/main" xmlns:r="http://schemas.openxmlformats.org/officeDocument/2006/relationships" xmlns:p="http://schemas.openxmlformats.org/presentationml/2006/main">
+  <p:cSld>
+    <p:spTree>
+      <p:nvGrpSpPr>
+        <p:cNvPr id="1" name=""/>
+        <p:cNvGrpSpPr/>
+        <p:nvPr/>
+      </p:nvGrpSpPr>
+      <p:grpSpPr>
+        <a:xfrm>
+          <a:off x="0" y="0"/>
+          <a:ext cx="0" cy="0"/>
+          <a:chOff x="0" y="0"/>
+          <a:chExt cx="0" cy="0"/>
+        </a:xfrm>
+      </p:grpSpPr>
+      <p:sp>
+        <p:nvSpPr>
+          <p:cNvPr id="2" name="Title 1">
+            <a:extLst>
+              <a:ext uri="{FF2B5EF4-FFF2-40B4-BE49-F238E27FC236}">
+                <a16:creationId xmlns:a16="http://schemas.microsoft.com/office/drawing/2014/main" id="{72C6AD10-C612-4855-A954-070C08F5C879}"/>
+              </a:ext>
+            </a:extLst>
+          </p:cNvPr>
+          <p:cNvSpPr>
+            <a:spLocks noGrp="1"/>
+          </p:cNvSpPr>
+          <p:nvPr>
+            <p:ph type="title"/>
+          </p:nvPr>
+        </p:nvSpPr>
+        <p:spPr/>
+        <p:txBody>
+          <a:bodyPr/>
+          <a:lstStyle/>
+          <a:p>
+            <a:r>
+              <a:rPr lang="en-IN" dirty="0"/>
+              <a:t>K-nearest neighbour</a:t>
+            </a:r>
+          </a:p>
+        </p:txBody>
+      </p:sp>
+      <p:sp>
+        <p:nvSpPr>
+          <p:cNvPr id="3" name="Content Placeholder 2">
+            <a:extLst>
+              <a:ext uri="{FF2B5EF4-FFF2-40B4-BE49-F238E27FC236}">
+                <a16:creationId xmlns:a16="http://schemas.microsoft.com/office/drawing/2014/main" id="{77105D34-2C32-4A55-AE84-5EEAD7F8B98D}"/>
+              </a:ext>
+            </a:extLst>
+          </p:cNvPr>
+          <p:cNvSpPr>
+            <a:spLocks noGrp="1"/>
+          </p:cNvSpPr>
+          <p:nvPr>
+            <p:ph idx="1"/>
+          </p:nvPr>
+        </p:nvSpPr>
+        <p:spPr>
+          <a:xfrm>
             <a:off x="-1221677" y="1825624"/>
             <a:ext cx="12288261" cy="6205121"/>
           </a:xfrm>
@@ -8191,7 +8485,7 @@
 </p:sld>
 </file>
 
-<file path=ppt/slides/slide27.xml><?xml version="1.0" encoding="utf-8"?>
+<file path=ppt/slides/slide28.xml><?xml version="1.0" encoding="utf-8"?>
 <p:sld xmlns:a="http://schemas.openxmlformats.org/drawingml/2006/main" xmlns:r="http://schemas.openxmlformats.org/officeDocument/2006/relationships" xmlns:p="http://schemas.openxmlformats.org/presentationml/2006/main">
   <p:cSld>
     <p:spTree>
@@ -9194,7 +9488,7 @@
 </p:sld>
 </file>
 
-<file path=ppt/slides/slide28.xml><?xml version="1.0" encoding="utf-8"?>
+<file path=ppt/slides/slide29.xml><?xml version="1.0" encoding="utf-8"?>
 <p:sld xmlns:a="http://schemas.openxmlformats.org/drawingml/2006/main" xmlns:r="http://schemas.openxmlformats.org/officeDocument/2006/relationships" xmlns:p="http://schemas.openxmlformats.org/presentationml/2006/main">
   <p:cSld>
     <p:spTree>
@@ -9707,7 +10001,137 @@
 </p:sld>
 </file>
 
-<file path=ppt/slides/slide29.xml><?xml version="1.0" encoding="utf-8"?>
+<file path=ppt/slides/slide3.xml><?xml version="1.0" encoding="utf-8"?>
+<p:sld xmlns:a="http://schemas.openxmlformats.org/drawingml/2006/main" xmlns:r="http://schemas.openxmlformats.org/officeDocument/2006/relationships" xmlns:p="http://schemas.openxmlformats.org/presentationml/2006/main">
+  <p:cSld>
+    <p:spTree>
+      <p:nvGrpSpPr>
+        <p:cNvPr id="1" name=""/>
+        <p:cNvGrpSpPr/>
+        <p:nvPr/>
+      </p:nvGrpSpPr>
+      <p:grpSpPr>
+        <a:xfrm>
+          <a:off x="0" y="0"/>
+          <a:ext cx="0" cy="0"/>
+          <a:chOff x="0" y="0"/>
+          <a:chExt cx="0" cy="0"/>
+        </a:xfrm>
+      </p:grpSpPr>
+      <p:sp>
+        <p:nvSpPr>
+          <p:cNvPr id="2" name="Title 1">
+            <a:extLst>
+              <a:ext uri="{FF2B5EF4-FFF2-40B4-BE49-F238E27FC236}">
+                <a16:creationId xmlns:a16="http://schemas.microsoft.com/office/drawing/2014/main" id="{9BE7A54E-4686-468B-8294-F50CA0796519}"/>
+              </a:ext>
+            </a:extLst>
+          </p:cNvPr>
+          <p:cNvSpPr>
+            <a:spLocks noGrp="1"/>
+          </p:cNvSpPr>
+          <p:nvPr>
+            <p:ph type="title"/>
+          </p:nvPr>
+        </p:nvSpPr>
+        <p:spPr/>
+        <p:txBody>
+          <a:bodyPr/>
+          <a:lstStyle/>
+          <a:p>
+            <a:r>
+              <a:rPr lang="en-IN" dirty="0"/>
+              <a:t>IDS vs Firewall : A common question</a:t>
+            </a:r>
+          </a:p>
+        </p:txBody>
+      </p:sp>
+      <p:sp>
+        <p:nvSpPr>
+          <p:cNvPr id="3" name="Content Placeholder 2">
+            <a:extLst>
+              <a:ext uri="{FF2B5EF4-FFF2-40B4-BE49-F238E27FC236}">
+                <a16:creationId xmlns:a16="http://schemas.microsoft.com/office/drawing/2014/main" id="{28FC06C3-5FEA-4791-8CAA-89530C67633E}"/>
+              </a:ext>
+            </a:extLst>
+          </p:cNvPr>
+          <p:cNvSpPr>
+            <a:spLocks noGrp="1"/>
+          </p:cNvSpPr>
+          <p:nvPr>
+            <p:ph idx="1"/>
+          </p:nvPr>
+        </p:nvSpPr>
+        <p:spPr>
+          <a:xfrm>
+            <a:off x="838200" y="2673764"/>
+            <a:ext cx="10515600" cy="4351338"/>
+          </a:xfrm>
+        </p:spPr>
+        <p:txBody>
+          <a:bodyPr/>
+          <a:lstStyle/>
+          <a:p>
+            <a:r>
+              <a:rPr lang="en-IN" dirty="0"/>
+              <a:t>Firewall uses a static set of rules to permit or deny network connections. It  detects intrusions from </a:t>
+            </a:r>
+            <a:r>
+              <a:rPr lang="en-IN" dirty="0">
+                <a:solidFill>
+                  <a:srgbClr val="FF0000"/>
+                </a:solidFill>
+              </a:rPr>
+              <a:t>outside the network</a:t>
+            </a:r>
+          </a:p>
+          <a:p>
+            <a:endParaRPr lang="en-IN" dirty="0">
+              <a:solidFill>
+                <a:srgbClr val="FF0000"/>
+              </a:solidFill>
+            </a:endParaRPr>
+          </a:p>
+          <a:p>
+            <a:r>
+              <a:rPr lang="en-IN" dirty="0"/>
+              <a:t>On the other hand, IDS can detect intrusions from the </a:t>
+            </a:r>
+            <a:r>
+              <a:rPr lang="en-IN" dirty="0">
+                <a:solidFill>
+                  <a:srgbClr val="FF0000"/>
+                </a:solidFill>
+              </a:rPr>
+              <a:t>within the network</a:t>
+            </a:r>
+            <a:r>
+              <a:rPr lang="en-IN" dirty="0"/>
+              <a:t> as well.</a:t>
+            </a:r>
+          </a:p>
+          <a:p>
+            <a:pPr marL="0" indent="0">
+              <a:buNone/>
+            </a:pPr>
+            <a:endParaRPr lang="en-IN" dirty="0"/>
+          </a:p>
+        </p:txBody>
+      </p:sp>
+    </p:spTree>
+    <p:extLst>
+      <p:ext uri="{BB962C8B-B14F-4D97-AF65-F5344CB8AC3E}">
+        <p14:creationId xmlns:p14="http://schemas.microsoft.com/office/powerpoint/2010/main" val="895573291"/>
+      </p:ext>
+    </p:extLst>
+  </p:cSld>
+  <p:clrMapOvr>
+    <a:masterClrMapping/>
+  </p:clrMapOvr>
+</p:sld>
+</file>
+
+<file path=ppt/slides/slide30.xml><?xml version="1.0" encoding="utf-8"?>
 <p:sld xmlns:a="http://schemas.openxmlformats.org/drawingml/2006/main" xmlns:r="http://schemas.openxmlformats.org/officeDocument/2006/relationships" xmlns:p="http://schemas.openxmlformats.org/presentationml/2006/main">
   <p:cSld>
     <p:spTree>
@@ -10289,482 +10713,6 @@
 </p:sld>
 </file>
 
-<file path=ppt/slides/slide3.xml><?xml version="1.0" encoding="utf-8"?>
-<p:sld xmlns:a="http://schemas.openxmlformats.org/drawingml/2006/main" xmlns:r="http://schemas.openxmlformats.org/officeDocument/2006/relationships" xmlns:p="http://schemas.openxmlformats.org/presentationml/2006/main">
-  <p:cSld>
-    <p:spTree>
-      <p:nvGrpSpPr>
-        <p:cNvPr id="1" name=""/>
-        <p:cNvGrpSpPr/>
-        <p:nvPr/>
-      </p:nvGrpSpPr>
-      <p:grpSpPr>
-        <a:xfrm>
-          <a:off x="0" y="0"/>
-          <a:ext cx="0" cy="0"/>
-          <a:chOff x="0" y="0"/>
-          <a:chExt cx="0" cy="0"/>
-        </a:xfrm>
-      </p:grpSpPr>
-      <p:sp>
-        <p:nvSpPr>
-          <p:cNvPr id="2" name="Title 1">
-            <a:extLst>
-              <a:ext uri="{FF2B5EF4-FFF2-40B4-BE49-F238E27FC236}">
-                <a16:creationId xmlns:a16="http://schemas.microsoft.com/office/drawing/2014/main" id="{9BE7A54E-4686-468B-8294-F50CA0796519}"/>
-              </a:ext>
-            </a:extLst>
-          </p:cNvPr>
-          <p:cNvSpPr>
-            <a:spLocks noGrp="1"/>
-          </p:cNvSpPr>
-          <p:nvPr>
-            <p:ph type="title"/>
-          </p:nvPr>
-        </p:nvSpPr>
-        <p:spPr/>
-        <p:txBody>
-          <a:bodyPr/>
-          <a:lstStyle/>
-          <a:p>
-            <a:r>
-              <a:rPr lang="en-IN" dirty="0"/>
-              <a:t>IDS vs Firewall : A common question</a:t>
-            </a:r>
-          </a:p>
-        </p:txBody>
-      </p:sp>
-      <p:sp>
-        <p:nvSpPr>
-          <p:cNvPr id="3" name="Content Placeholder 2">
-            <a:extLst>
-              <a:ext uri="{FF2B5EF4-FFF2-40B4-BE49-F238E27FC236}">
-                <a16:creationId xmlns:a16="http://schemas.microsoft.com/office/drawing/2014/main" id="{28FC06C3-5FEA-4791-8CAA-89530C67633E}"/>
-              </a:ext>
-            </a:extLst>
-          </p:cNvPr>
-          <p:cNvSpPr>
-            <a:spLocks noGrp="1"/>
-          </p:cNvSpPr>
-          <p:nvPr>
-            <p:ph idx="1"/>
-          </p:nvPr>
-        </p:nvSpPr>
-        <p:spPr>
-          <a:xfrm>
-            <a:off x="838200" y="2673764"/>
-            <a:ext cx="10515600" cy="4351338"/>
-          </a:xfrm>
-        </p:spPr>
-        <p:txBody>
-          <a:bodyPr/>
-          <a:lstStyle/>
-          <a:p>
-            <a:r>
-              <a:rPr lang="en-IN" dirty="0"/>
-              <a:t>Firewall uses a static set of rules to permit or deny network connections. It  detects intrusions from </a:t>
-            </a:r>
-            <a:r>
-              <a:rPr lang="en-IN" dirty="0">
-                <a:solidFill>
-                  <a:srgbClr val="FF0000"/>
-                </a:solidFill>
-              </a:rPr>
-              <a:t>outside the network</a:t>
-            </a:r>
-          </a:p>
-          <a:p>
-            <a:endParaRPr lang="en-IN" dirty="0">
-              <a:solidFill>
-                <a:srgbClr val="FF0000"/>
-              </a:solidFill>
-            </a:endParaRPr>
-          </a:p>
-          <a:p>
-            <a:r>
-              <a:rPr lang="en-IN" dirty="0"/>
-              <a:t>On the other hand, IDS can detect intrusions from the </a:t>
-            </a:r>
-            <a:r>
-              <a:rPr lang="en-IN" dirty="0">
-                <a:solidFill>
-                  <a:srgbClr val="FF0000"/>
-                </a:solidFill>
-              </a:rPr>
-              <a:t>within the network</a:t>
-            </a:r>
-            <a:r>
-              <a:rPr lang="en-IN" dirty="0"/>
-              <a:t> as well.</a:t>
-            </a:r>
-          </a:p>
-          <a:p>
-            <a:pPr marL="0" indent="0">
-              <a:buNone/>
-            </a:pPr>
-            <a:endParaRPr lang="en-IN" dirty="0"/>
-          </a:p>
-        </p:txBody>
-      </p:sp>
-    </p:spTree>
-    <p:extLst>
-      <p:ext uri="{BB962C8B-B14F-4D97-AF65-F5344CB8AC3E}">
-        <p14:creationId xmlns:p14="http://schemas.microsoft.com/office/powerpoint/2010/main" val="895573291"/>
-      </p:ext>
-    </p:extLst>
-  </p:cSld>
-  <p:clrMapOvr>
-    <a:masterClrMapping/>
-  </p:clrMapOvr>
-</p:sld>
-</file>
-
-<file path=ppt/slides/slide30.xml><?xml version="1.0" encoding="utf-8"?>
-<p:sld xmlns:a="http://schemas.openxmlformats.org/drawingml/2006/main" xmlns:r="http://schemas.openxmlformats.org/officeDocument/2006/relationships" xmlns:p="http://schemas.openxmlformats.org/presentationml/2006/main">
-  <p:cSld>
-    <p:spTree>
-      <p:nvGrpSpPr>
-        <p:cNvPr id="1" name=""/>
-        <p:cNvGrpSpPr/>
-        <p:nvPr/>
-      </p:nvGrpSpPr>
-      <p:grpSpPr>
-        <a:xfrm>
-          <a:off x="0" y="0"/>
-          <a:ext cx="0" cy="0"/>
-          <a:chOff x="0" y="0"/>
-          <a:chExt cx="0" cy="0"/>
-        </a:xfrm>
-      </p:grpSpPr>
-      <p:sp>
-        <p:nvSpPr>
-          <p:cNvPr id="2" name="Title 1">
-            <a:extLst>
-              <a:ext uri="{FF2B5EF4-FFF2-40B4-BE49-F238E27FC236}">
-                <a16:creationId xmlns:a16="http://schemas.microsoft.com/office/drawing/2014/main" id="{72C6AD10-C612-4855-A954-070C08F5C879}"/>
-              </a:ext>
-            </a:extLst>
-          </p:cNvPr>
-          <p:cNvSpPr>
-            <a:spLocks noGrp="1"/>
-          </p:cNvSpPr>
-          <p:nvPr>
-            <p:ph type="title"/>
-          </p:nvPr>
-        </p:nvSpPr>
-        <p:spPr/>
-        <p:txBody>
-          <a:bodyPr/>
-          <a:lstStyle/>
-          <a:p>
-            <a:r>
-              <a:rPr lang="en-IN" dirty="0"/>
-              <a:t>Logistic regression</a:t>
-            </a:r>
-          </a:p>
-        </p:txBody>
-      </p:sp>
-      <p:sp>
-        <p:nvSpPr>
-          <p:cNvPr id="3" name="Content Placeholder 2">
-            <a:extLst>
-              <a:ext uri="{FF2B5EF4-FFF2-40B4-BE49-F238E27FC236}">
-                <a16:creationId xmlns:a16="http://schemas.microsoft.com/office/drawing/2014/main" id="{77105D34-2C32-4A55-AE84-5EEAD7F8B98D}"/>
-              </a:ext>
-            </a:extLst>
-          </p:cNvPr>
-          <p:cNvSpPr>
-            <a:spLocks noGrp="1"/>
-          </p:cNvSpPr>
-          <p:nvPr>
-            <p:ph idx="1"/>
-          </p:nvPr>
-        </p:nvSpPr>
-        <p:spPr>
-          <a:xfrm>
-            <a:off x="838199" y="1825624"/>
-            <a:ext cx="10992729" cy="4561107"/>
-          </a:xfrm>
-        </p:spPr>
-        <p:txBody>
-          <a:bodyPr>
-            <a:normAutofit/>
-          </a:bodyPr>
-          <a:lstStyle/>
-          <a:p>
-            <a:endParaRPr lang="en-IN" dirty="0"/>
-          </a:p>
-          <a:p>
-            <a:endParaRPr lang="en-IN" dirty="0"/>
-          </a:p>
-          <a:p>
-            <a:endParaRPr lang="en-IN" dirty="0"/>
-          </a:p>
-        </p:txBody>
-      </p:sp>
-      <p:sp>
-        <p:nvSpPr>
-          <p:cNvPr id="6" name="TextBox 5">
-            <a:extLst>
-              <a:ext uri="{FF2B5EF4-FFF2-40B4-BE49-F238E27FC236}">
-                <a16:creationId xmlns:a16="http://schemas.microsoft.com/office/drawing/2014/main" id="{978EFC57-0E6D-49A6-A236-A581FD45F8F9}"/>
-              </a:ext>
-            </a:extLst>
-          </p:cNvPr>
-          <p:cNvSpPr txBox="1"/>
-          <p:nvPr/>
-        </p:nvSpPr>
-        <p:spPr>
-          <a:xfrm>
-            <a:off x="488742" y="1603152"/>
-            <a:ext cx="6123184" cy="2677656"/>
-          </a:xfrm>
-          <a:prstGeom prst="rect">
-            <a:avLst/>
-          </a:prstGeom>
-          <a:noFill/>
-        </p:spPr>
-        <p:txBody>
-          <a:bodyPr wrap="square" rtlCol="0">
-            <a:spAutoFit/>
-          </a:bodyPr>
-          <a:lstStyle/>
-          <a:p>
-            <a:r>
-              <a:rPr lang="en-IN" sz="2400" dirty="0">
-                <a:solidFill>
-                  <a:srgbClr val="FF0000"/>
-                </a:solidFill>
-              </a:rPr>
-              <a:t>Assumption</a:t>
-            </a:r>
-            <a:r>
-              <a:rPr lang="en-IN" sz="2400" dirty="0"/>
-              <a:t>: data points are linearly separable</a:t>
-            </a:r>
-          </a:p>
-          <a:p>
-            <a:endParaRPr lang="en-IN" sz="2400" dirty="0"/>
-          </a:p>
-          <a:p>
-            <a:r>
-              <a:rPr lang="en-IN" sz="2400" dirty="0"/>
-              <a:t>In this we have to find a plane that minimizes the logistic loss</a:t>
-            </a:r>
-          </a:p>
-          <a:p>
-            <a:endParaRPr lang="en-IN" sz="2400" dirty="0"/>
-          </a:p>
-          <a:p>
-            <a:r>
-              <a:rPr lang="en-IN" sz="2400" dirty="0"/>
-              <a:t>Points in direction of normal (w) will be positive</a:t>
-            </a:r>
-          </a:p>
-          <a:p>
-            <a:r>
-              <a:rPr lang="en-IN" sz="2400" dirty="0"/>
-              <a:t>and opposite to it will be negative</a:t>
-            </a:r>
-          </a:p>
-        </p:txBody>
-      </p:sp>
-      <p:pic>
-        <p:nvPicPr>
-          <p:cNvPr id="4" name="Picture 3">
-            <a:extLst>
-              <a:ext uri="{FF2B5EF4-FFF2-40B4-BE49-F238E27FC236}">
-                <a16:creationId xmlns:a16="http://schemas.microsoft.com/office/drawing/2014/main" id="{A8A01BBD-11A6-4262-9B8E-FE899A569EEB}"/>
-              </a:ext>
-            </a:extLst>
-          </p:cNvPr>
-          <p:cNvPicPr>
-            <a:picLocks noChangeAspect="1"/>
-          </p:cNvPicPr>
-          <p:nvPr/>
-        </p:nvPicPr>
-        <p:blipFill>
-          <a:blip r:embed="rId2"/>
-          <a:stretch>
-            <a:fillRect/>
-          </a:stretch>
-        </p:blipFill>
-        <p:spPr>
-          <a:xfrm>
-            <a:off x="1372054" y="4554402"/>
-            <a:ext cx="6599917" cy="1275984"/>
-          </a:xfrm>
-          <a:prstGeom prst="rect">
-            <a:avLst/>
-          </a:prstGeom>
-        </p:spPr>
-      </p:pic>
-      <p:pic>
-        <p:nvPicPr>
-          <p:cNvPr id="12" name="Picture 11">
-            <a:extLst>
-              <a:ext uri="{FF2B5EF4-FFF2-40B4-BE49-F238E27FC236}">
-                <a16:creationId xmlns:a16="http://schemas.microsoft.com/office/drawing/2014/main" id="{9266AE25-F522-4620-8E9F-5E07942A9C24}"/>
-              </a:ext>
-            </a:extLst>
-          </p:cNvPr>
-          <p:cNvPicPr>
-            <a:picLocks noChangeAspect="1"/>
-          </p:cNvPicPr>
-          <p:nvPr/>
-        </p:nvPicPr>
-        <p:blipFill>
-          <a:blip r:embed="rId3"/>
-          <a:stretch>
-            <a:fillRect/>
-          </a:stretch>
-        </p:blipFill>
-        <p:spPr>
-          <a:xfrm>
-            <a:off x="8438209" y="365125"/>
-            <a:ext cx="3617465" cy="4874598"/>
-          </a:xfrm>
-          <a:prstGeom prst="rect">
-            <a:avLst/>
-          </a:prstGeom>
-        </p:spPr>
-      </p:pic>
-      <p:sp>
-        <p:nvSpPr>
-          <p:cNvPr id="7" name="Oval 6">
-            <a:extLst>
-              <a:ext uri="{FF2B5EF4-FFF2-40B4-BE49-F238E27FC236}">
-                <a16:creationId xmlns:a16="http://schemas.microsoft.com/office/drawing/2014/main" id="{3471CB55-FA1E-429D-964C-B0A882ADFE14}"/>
-              </a:ext>
-            </a:extLst>
-          </p:cNvPr>
-          <p:cNvSpPr/>
-          <p:nvPr/>
-        </p:nvSpPr>
-        <p:spPr>
-          <a:xfrm>
-            <a:off x="3944455" y="4565745"/>
-            <a:ext cx="3971330" cy="970013"/>
-          </a:xfrm>
-          <a:prstGeom prst="ellipse">
-            <a:avLst/>
-          </a:prstGeom>
-          <a:noFill/>
-        </p:spPr>
-        <p:style>
-          <a:lnRef idx="2">
-            <a:schemeClr val="accent1">
-              <a:shade val="50000"/>
-            </a:schemeClr>
-          </a:lnRef>
-          <a:fillRef idx="1">
-            <a:schemeClr val="accent1"/>
-          </a:fillRef>
-          <a:effectRef idx="0">
-            <a:schemeClr val="accent1"/>
-          </a:effectRef>
-          <a:fontRef idx="minor">
-            <a:schemeClr val="lt1"/>
-          </a:fontRef>
-        </p:style>
-        <p:txBody>
-          <a:bodyPr rtlCol="0" anchor="ctr"/>
-          <a:lstStyle/>
-          <a:p>
-            <a:pPr algn="ctr"/>
-            <a:endParaRPr lang="en-IN" dirty="0"/>
-          </a:p>
-        </p:txBody>
-      </p:sp>
-      <p:cxnSp>
-        <p:nvCxnSpPr>
-          <p:cNvPr id="9" name="Straight Arrow Connector 8">
-            <a:extLst>
-              <a:ext uri="{FF2B5EF4-FFF2-40B4-BE49-F238E27FC236}">
-                <a16:creationId xmlns:a16="http://schemas.microsoft.com/office/drawing/2014/main" id="{10576E28-A54B-4110-803D-431F068F8078}"/>
-              </a:ext>
-            </a:extLst>
-          </p:cNvPr>
-          <p:cNvCxnSpPr>
-            <a:cxnSpLocks/>
-          </p:cNvCxnSpPr>
-          <p:nvPr/>
-        </p:nvCxnSpPr>
-        <p:spPr>
-          <a:xfrm flipV="1">
-            <a:off x="5449740" y="5535758"/>
-            <a:ext cx="393300" cy="323423"/>
-          </a:xfrm>
-          <a:prstGeom prst="straightConnector1">
-            <a:avLst/>
-          </a:prstGeom>
-          <a:ln>
-            <a:tailEnd type="triangle"/>
-          </a:ln>
-        </p:spPr>
-        <p:style>
-          <a:lnRef idx="1">
-            <a:schemeClr val="accent1"/>
-          </a:lnRef>
-          <a:fillRef idx="0">
-            <a:schemeClr val="accent1"/>
-          </a:fillRef>
-          <a:effectRef idx="0">
-            <a:schemeClr val="accent1"/>
-          </a:effectRef>
-          <a:fontRef idx="minor">
-            <a:schemeClr val="tx1"/>
-          </a:fontRef>
-        </p:style>
-      </p:cxnSp>
-      <p:sp>
-        <p:nvSpPr>
-          <p:cNvPr id="10" name="TextBox 9">
-            <a:extLst>
-              <a:ext uri="{FF2B5EF4-FFF2-40B4-BE49-F238E27FC236}">
-                <a16:creationId xmlns:a16="http://schemas.microsoft.com/office/drawing/2014/main" id="{5E7161FD-8D16-49E9-972E-2AAD9635AB83}"/>
-              </a:ext>
-            </a:extLst>
-          </p:cNvPr>
-          <p:cNvSpPr txBox="1"/>
-          <p:nvPr/>
-        </p:nvSpPr>
-        <p:spPr>
-          <a:xfrm>
-            <a:off x="4176614" y="6088360"/>
-            <a:ext cx="2546253" cy="461665"/>
-          </a:xfrm>
-          <a:prstGeom prst="rect">
-            <a:avLst/>
-          </a:prstGeom>
-          <a:noFill/>
-        </p:spPr>
-        <p:txBody>
-          <a:bodyPr wrap="square" rtlCol="0">
-            <a:spAutoFit/>
-          </a:bodyPr>
-          <a:lstStyle/>
-          <a:p>
-            <a:r>
-              <a:rPr lang="en-IN" sz="2400" dirty="0"/>
-              <a:t>Logistic loss</a:t>
-            </a:r>
-          </a:p>
-        </p:txBody>
-      </p:sp>
-    </p:spTree>
-    <p:extLst>
-      <p:ext uri="{BB962C8B-B14F-4D97-AF65-F5344CB8AC3E}">
-        <p14:creationId xmlns:p14="http://schemas.microsoft.com/office/powerpoint/2010/main" val="2582340681"/>
-      </p:ext>
-    </p:extLst>
-  </p:cSld>
-  <p:clrMapOvr>
-    <a:masterClrMapping/>
-  </p:clrMapOvr>
-</p:sld>
-</file>
-
 <file path=ppt/slides/slide31.xml><?xml version="1.0" encoding="utf-8"?>
 <p:sld xmlns:a="http://schemas.openxmlformats.org/drawingml/2006/main" xmlns:r="http://schemas.openxmlformats.org/officeDocument/2006/relationships" xmlns:p="http://schemas.openxmlformats.org/presentationml/2006/main">
   <p:cSld>
@@ -10787,7 +10735,7 @@
           <p:cNvPr id="2" name="Title 1">
             <a:extLst>
               <a:ext uri="{FF2B5EF4-FFF2-40B4-BE49-F238E27FC236}">
-                <a16:creationId xmlns:a16="http://schemas.microsoft.com/office/drawing/2014/main" id="{698FC6E4-8F67-4363-B815-64681728C3A0}"/>
+                <a16:creationId xmlns:a16="http://schemas.microsoft.com/office/drawing/2014/main" id="{72C6AD10-C612-4855-A954-070C08F5C879}"/>
               </a:ext>
             </a:extLst>
           </p:cNvPr>
@@ -10798,19 +10746,14 @@
             <p:ph type="title"/>
           </p:nvPr>
         </p:nvSpPr>
-        <p:spPr>
-          <a:xfrm>
-            <a:off x="526366" y="159156"/>
-            <a:ext cx="10515600" cy="1325563"/>
-          </a:xfrm>
-        </p:spPr>
+        <p:spPr/>
         <p:txBody>
           <a:bodyPr/>
           <a:lstStyle/>
           <a:p>
             <a:r>
               <a:rPr lang="en-IN" dirty="0"/>
-              <a:t>Decision tree classifier</a:t>
+              <a:t>Logistic regression</a:t>
             </a:r>
           </a:p>
         </p:txBody>
@@ -10820,7 +10763,7 @@
           <p:cNvPr id="3" name="Content Placeholder 2">
             <a:extLst>
               <a:ext uri="{FF2B5EF4-FFF2-40B4-BE49-F238E27FC236}">
-                <a16:creationId xmlns:a16="http://schemas.microsoft.com/office/drawing/2014/main" id="{2E2A96CB-C803-4D4B-B24D-6417343D2C74}"/>
+                <a16:creationId xmlns:a16="http://schemas.microsoft.com/office/drawing/2014/main" id="{77105D34-2C32-4A55-AE84-5EEAD7F8B98D}"/>
               </a:ext>
             </a:extLst>
           </p:cNvPr>
@@ -10833,60 +10776,90 @@
         </p:nvSpPr>
         <p:spPr>
           <a:xfrm>
-            <a:off x="331763" y="1825625"/>
-            <a:ext cx="10515600" cy="4351338"/>
-          </a:xfrm>
-        </p:spPr>
-        <p:txBody>
-          <a:bodyPr/>
-          <a:lstStyle/>
-          <a:p>
-            <a:pPr marL="0" indent="0">
-              <a:buNone/>
-            </a:pPr>
-            <a:r>
-              <a:rPr lang="en-IN" dirty="0"/>
-              <a:t>Let’s first talk about entropy</a:t>
-            </a:r>
-          </a:p>
-          <a:p>
-            <a:pPr marL="0" indent="0">
-              <a:buNone/>
-            </a:pPr>
+            <a:off x="838199" y="1825624"/>
+            <a:ext cx="10992729" cy="4561107"/>
+          </a:xfrm>
+        </p:spPr>
+        <p:txBody>
+          <a:bodyPr>
+            <a:normAutofit/>
+          </a:bodyPr>
+          <a:lstStyle/>
+          <a:p>
             <a:endParaRPr lang="en-IN" dirty="0"/>
           </a:p>
           <a:p>
-            <a:pPr marL="0" indent="0">
-              <a:buNone/>
-            </a:pPr>
-            <a:r>
-              <a:rPr lang="en-IN" dirty="0"/>
-              <a:t>Take a ball from </a:t>
-            </a:r>
-          </a:p>
-          <a:p>
-            <a:pPr marL="0" indent="0">
-              <a:buNone/>
-            </a:pPr>
-            <a:r>
-              <a:rPr lang="en-IN" dirty="0"/>
-              <a:t>each of the boxes</a:t>
-            </a:r>
-          </a:p>
-          <a:p>
-            <a:pPr marL="0" indent="0">
-              <a:buNone/>
-            </a:pPr>
-            <a:r>
-              <a:rPr lang="en-IN" dirty="0"/>
-              <a:t>and guess the colour</a:t>
-            </a:r>
-          </a:p>
-          <a:p>
-            <a:pPr marL="0" indent="0">
-              <a:buNone/>
-            </a:pPr>
             <a:endParaRPr lang="en-IN" dirty="0"/>
+          </a:p>
+          <a:p>
+            <a:endParaRPr lang="en-IN" dirty="0"/>
+          </a:p>
+        </p:txBody>
+      </p:sp>
+      <p:sp>
+        <p:nvSpPr>
+          <p:cNvPr id="6" name="TextBox 5">
+            <a:extLst>
+              <a:ext uri="{FF2B5EF4-FFF2-40B4-BE49-F238E27FC236}">
+                <a16:creationId xmlns:a16="http://schemas.microsoft.com/office/drawing/2014/main" id="{978EFC57-0E6D-49A6-A236-A581FD45F8F9}"/>
+              </a:ext>
+            </a:extLst>
+          </p:cNvPr>
+          <p:cNvSpPr txBox="1"/>
+          <p:nvPr/>
+        </p:nvSpPr>
+        <p:spPr>
+          <a:xfrm>
+            <a:off x="488742" y="1603152"/>
+            <a:ext cx="6123184" cy="2677656"/>
+          </a:xfrm>
+          <a:prstGeom prst="rect">
+            <a:avLst/>
+          </a:prstGeom>
+          <a:noFill/>
+        </p:spPr>
+        <p:txBody>
+          <a:bodyPr wrap="square" rtlCol="0">
+            <a:spAutoFit/>
+          </a:bodyPr>
+          <a:lstStyle/>
+          <a:p>
+            <a:r>
+              <a:rPr lang="en-IN" sz="2400" dirty="0">
+                <a:solidFill>
+                  <a:srgbClr val="FF0000"/>
+                </a:solidFill>
+              </a:rPr>
+              <a:t>Assumption</a:t>
+            </a:r>
+            <a:r>
+              <a:rPr lang="en-IN" sz="2400" dirty="0"/>
+              <a:t>: data points are linearly separable</a:t>
+            </a:r>
+          </a:p>
+          <a:p>
+            <a:endParaRPr lang="en-IN" sz="2400" dirty="0"/>
+          </a:p>
+          <a:p>
+            <a:r>
+              <a:rPr lang="en-IN" sz="2400" dirty="0"/>
+              <a:t>In this we have to find a plane that minimizes the logistic loss</a:t>
+            </a:r>
+          </a:p>
+          <a:p>
+            <a:endParaRPr lang="en-IN" sz="2400" dirty="0"/>
+          </a:p>
+          <a:p>
+            <a:r>
+              <a:rPr lang="en-IN" sz="2400" dirty="0"/>
+              <a:t>Points in direction of normal (w) will be positive</a:t>
+            </a:r>
+          </a:p>
+          <a:p>
+            <a:r>
+              <a:rPr lang="en-IN" sz="2400" dirty="0"/>
+              <a:t>and opposite to it will be negative</a:t>
+            </a:r>
           </a:p>
         </p:txBody>
       </p:sp>
@@ -10895,7 +10868,7 @@
           <p:cNvPr id="4" name="Picture 3">
             <a:extLst>
               <a:ext uri="{FF2B5EF4-FFF2-40B4-BE49-F238E27FC236}">
-                <a16:creationId xmlns:a16="http://schemas.microsoft.com/office/drawing/2014/main" id="{1E7F6418-FFB2-4D56-87E0-A18D102AC396}"/>
+                <a16:creationId xmlns:a16="http://schemas.microsoft.com/office/drawing/2014/main" id="{A8A01BBD-11A6-4262-9B8E-FE899A569EEB}"/>
               </a:ext>
             </a:extLst>
           </p:cNvPr>
@@ -10912,67 +10885,109 @@
         </p:blipFill>
         <p:spPr>
           <a:xfrm>
-            <a:off x="3524262" y="2348047"/>
-            <a:ext cx="8667738" cy="3306494"/>
+            <a:off x="1372054" y="4554402"/>
+            <a:ext cx="6599917" cy="1275984"/>
           </a:xfrm>
           <a:prstGeom prst="rect">
             <a:avLst/>
           </a:prstGeom>
         </p:spPr>
       </p:pic>
-      <p:sp>
-        <p:nvSpPr>
-          <p:cNvPr id="5" name="TextBox 4">
-            <a:extLst>
-              <a:ext uri="{FF2B5EF4-FFF2-40B4-BE49-F238E27FC236}">
-                <a16:creationId xmlns:a16="http://schemas.microsoft.com/office/drawing/2014/main" id="{0041908B-C5B4-4D83-AFDE-3E43C7A43B46}"/>
-              </a:ext>
-            </a:extLst>
-          </p:cNvPr>
-          <p:cNvSpPr txBox="1"/>
+      <p:pic>
+        <p:nvPicPr>
+          <p:cNvPr id="12" name="Picture 11">
+            <a:extLst>
+              <a:ext uri="{FF2B5EF4-FFF2-40B4-BE49-F238E27FC236}">
+                <a16:creationId xmlns:a16="http://schemas.microsoft.com/office/drawing/2014/main" id="{9266AE25-F522-4620-8E9F-5E07942A9C24}"/>
+              </a:ext>
+            </a:extLst>
+          </p:cNvPr>
+          <p:cNvPicPr>
+            <a:picLocks noChangeAspect="1"/>
+          </p:cNvPicPr>
           <p:nvPr/>
-        </p:nvSpPr>
+        </p:nvPicPr>
+        <p:blipFill>
+          <a:blip r:embed="rId3"/>
+          <a:stretch>
+            <a:fillRect/>
+          </a:stretch>
+        </p:blipFill>
         <p:spPr>
           <a:xfrm>
-            <a:off x="6096000" y="1321355"/>
-            <a:ext cx="1894449" cy="830997"/>
+            <a:off x="8438209" y="365125"/>
+            <a:ext cx="3617465" cy="4874598"/>
           </a:xfrm>
           <a:prstGeom prst="rect">
             <a:avLst/>
           </a:prstGeom>
+        </p:spPr>
+      </p:pic>
+      <p:sp>
+        <p:nvSpPr>
+          <p:cNvPr id="7" name="Oval 6">
+            <a:extLst>
+              <a:ext uri="{FF2B5EF4-FFF2-40B4-BE49-F238E27FC236}">
+                <a16:creationId xmlns:a16="http://schemas.microsoft.com/office/drawing/2014/main" id="{3471CB55-FA1E-429D-964C-B0A882ADFE14}"/>
+              </a:ext>
+            </a:extLst>
+          </p:cNvPr>
+          <p:cNvSpPr/>
+          <p:nvPr/>
+        </p:nvSpPr>
+        <p:spPr>
+          <a:xfrm>
+            <a:off x="3944455" y="4565745"/>
+            <a:ext cx="3971330" cy="970013"/>
+          </a:xfrm>
+          <a:prstGeom prst="ellipse">
+            <a:avLst/>
+          </a:prstGeom>
           <a:noFill/>
         </p:spPr>
-        <p:txBody>
-          <a:bodyPr wrap="square" rtlCol="0">
-            <a:spAutoFit/>
-          </a:bodyPr>
-          <a:lstStyle/>
-          <a:p>
-            <a:r>
-              <a:rPr lang="en-IN" sz="2400" dirty="0"/>
-              <a:t>Most likely blue</a:t>
-            </a:r>
+        <p:style>
+          <a:lnRef idx="2">
+            <a:schemeClr val="accent1">
+              <a:shade val="50000"/>
+            </a:schemeClr>
+          </a:lnRef>
+          <a:fillRef idx="1">
+            <a:schemeClr val="accent1"/>
+          </a:fillRef>
+          <a:effectRef idx="0">
+            <a:schemeClr val="accent1"/>
+          </a:effectRef>
+          <a:fontRef idx="minor">
+            <a:schemeClr val="lt1"/>
+          </a:fontRef>
+        </p:style>
+        <p:txBody>
+          <a:bodyPr rtlCol="0" anchor="ctr"/>
+          <a:lstStyle/>
+          <a:p>
+            <a:pPr algn="ctr"/>
+            <a:endParaRPr lang="en-IN" dirty="0"/>
           </a:p>
         </p:txBody>
       </p:sp>
       <p:cxnSp>
         <p:nvCxnSpPr>
-          <p:cNvPr id="7" name="Straight Arrow Connector 6">
-            <a:extLst>
-              <a:ext uri="{FF2B5EF4-FFF2-40B4-BE49-F238E27FC236}">
-                <a16:creationId xmlns:a16="http://schemas.microsoft.com/office/drawing/2014/main" id="{1DEC1C69-191F-4281-B494-C40D2DB54163}"/>
+          <p:cNvPr id="9" name="Straight Arrow Connector 8">
+            <a:extLst>
+              <a:ext uri="{FF2B5EF4-FFF2-40B4-BE49-F238E27FC236}">
+                <a16:creationId xmlns:a16="http://schemas.microsoft.com/office/drawing/2014/main" id="{10576E28-A54B-4110-803D-431F068F8078}"/>
               </a:ext>
             </a:extLst>
           </p:cNvPr>
           <p:cNvCxnSpPr>
-            <a:stCxn id="5" idx="1"/>
+            <a:cxnSpLocks/>
           </p:cNvCxnSpPr>
           <p:nvPr/>
         </p:nvCxnSpPr>
         <p:spPr>
-          <a:xfrm flipH="1">
-            <a:off x="5472332" y="1736854"/>
-            <a:ext cx="623668" cy="739060"/>
+          <a:xfrm flipV="1">
+            <a:off x="5449740" y="5535758"/>
+            <a:ext cx="393300" cy="323423"/>
           </a:xfrm>
           <a:prstGeom prst="straightConnector1">
             <a:avLst/>
@@ -10998,10 +11013,10 @@
       </p:cxnSp>
       <p:sp>
         <p:nvSpPr>
-          <p:cNvPr id="8" name="TextBox 7">
-            <a:extLst>
-              <a:ext uri="{FF2B5EF4-FFF2-40B4-BE49-F238E27FC236}">
-                <a16:creationId xmlns:a16="http://schemas.microsoft.com/office/drawing/2014/main" id="{58ECBE6F-6A49-4577-85F9-76CD42C8EB2C}"/>
+          <p:cNvPr id="10" name="TextBox 9">
+            <a:extLst>
+              <a:ext uri="{FF2B5EF4-FFF2-40B4-BE49-F238E27FC236}">
+                <a16:creationId xmlns:a16="http://schemas.microsoft.com/office/drawing/2014/main" id="{5E7161FD-8D16-49E9-972E-2AAD9635AB83}"/>
               </a:ext>
             </a:extLst>
           </p:cNvPr>
@@ -11010,8 +11025,8 @@
         </p:nvSpPr>
         <p:spPr>
           <a:xfrm>
-            <a:off x="9509760" y="1321355"/>
-            <a:ext cx="2265748" cy="461665"/>
+            <a:off x="4176614" y="6088360"/>
+            <a:ext cx="2546253" cy="461665"/>
           </a:xfrm>
           <a:prstGeom prst="rect">
             <a:avLst/>
@@ -11019,92 +11034,14 @@
           <a:noFill/>
         </p:spPr>
         <p:txBody>
-          <a:bodyPr wrap="none" rtlCol="0">
+          <a:bodyPr wrap="square" rtlCol="0">
             <a:spAutoFit/>
           </a:bodyPr>
           <a:lstStyle/>
           <a:p>
             <a:r>
               <a:rPr lang="en-IN" sz="2400" dirty="0"/>
-              <a:t>Difficult to guess</a:t>
-            </a:r>
-          </a:p>
-        </p:txBody>
-      </p:sp>
-      <p:cxnSp>
-        <p:nvCxnSpPr>
-          <p:cNvPr id="10" name="Straight Arrow Connector 9">
-            <a:extLst>
-              <a:ext uri="{FF2B5EF4-FFF2-40B4-BE49-F238E27FC236}">
-                <a16:creationId xmlns:a16="http://schemas.microsoft.com/office/drawing/2014/main" id="{EAA67FFE-605E-4061-A8F2-89B87F2E591A}"/>
-              </a:ext>
-            </a:extLst>
-          </p:cNvPr>
-          <p:cNvCxnSpPr/>
-          <p:nvPr/>
-        </p:nvCxnSpPr>
-        <p:spPr>
-          <a:xfrm flipH="1">
-            <a:off x="9608234" y="1783020"/>
-            <a:ext cx="140677" cy="664758"/>
-          </a:xfrm>
-          <a:prstGeom prst="straightConnector1">
-            <a:avLst/>
-          </a:prstGeom>
-          <a:ln>
-            <a:tailEnd type="triangle"/>
-          </a:ln>
-        </p:spPr>
-        <p:style>
-          <a:lnRef idx="1">
-            <a:schemeClr val="accent1"/>
-          </a:lnRef>
-          <a:fillRef idx="0">
-            <a:schemeClr val="accent1"/>
-          </a:fillRef>
-          <a:effectRef idx="0">
-            <a:schemeClr val="accent1"/>
-          </a:effectRef>
-          <a:fontRef idx="minor">
-            <a:schemeClr val="tx1"/>
-          </a:fontRef>
-        </p:style>
-      </p:cxnSp>
-      <p:sp>
-        <p:nvSpPr>
-          <p:cNvPr id="11" name="TextBox 10">
-            <a:extLst>
-              <a:ext uri="{FF2B5EF4-FFF2-40B4-BE49-F238E27FC236}">
-                <a16:creationId xmlns:a16="http://schemas.microsoft.com/office/drawing/2014/main" id="{63E4CF47-6A62-4ED3-907E-78C6DF4716EC}"/>
-              </a:ext>
-            </a:extLst>
-          </p:cNvPr>
-          <p:cNvSpPr txBox="1"/>
-          <p:nvPr/>
-        </p:nvSpPr>
-        <p:spPr>
-          <a:xfrm>
-            <a:off x="2755669" y="6176564"/>
-            <a:ext cx="7713074" cy="523220"/>
-          </a:xfrm>
-          <a:prstGeom prst="rect">
-            <a:avLst/>
-          </a:prstGeom>
-          <a:noFill/>
-        </p:spPr>
-        <p:txBody>
-          <a:bodyPr wrap="none" rtlCol="0">
-            <a:spAutoFit/>
-          </a:bodyPr>
-          <a:lstStyle/>
-          <a:p>
-            <a:r>
-              <a:rPr lang="en-IN" sz="2800" dirty="0">
-                <a:solidFill>
-                  <a:srgbClr val="FF0000"/>
-                </a:solidFill>
-              </a:rPr>
-              <a:t>Because Box 1 has less randomness i.e. less entropy</a:t>
+              <a:t>Logistic loss</a:t>
             </a:r>
           </a:p>
         </p:txBody>
@@ -11112,241 +11049,13 @@
     </p:spTree>
     <p:extLst>
       <p:ext uri="{BB962C8B-B14F-4D97-AF65-F5344CB8AC3E}">
-        <p14:creationId xmlns:p14="http://schemas.microsoft.com/office/powerpoint/2010/main" val="4027938627"/>
+        <p14:creationId xmlns:p14="http://schemas.microsoft.com/office/powerpoint/2010/main" val="2582340681"/>
       </p:ext>
     </p:extLst>
   </p:cSld>
   <p:clrMapOvr>
     <a:masterClrMapping/>
   </p:clrMapOvr>
-  <p:timing>
-    <p:tnLst>
-      <p:par>
-        <p:cTn id="1" dur="indefinite" restart="never" nodeType="tmRoot">
-          <p:childTnLst>
-            <p:seq concurrent="1" nextAc="seek">
-              <p:cTn id="2" dur="indefinite" nodeType="mainSeq">
-                <p:childTnLst>
-                  <p:par>
-                    <p:cTn id="3" fill="hold">
-                      <p:stCondLst>
-                        <p:cond delay="indefinite"/>
-                      </p:stCondLst>
-                      <p:childTnLst>
-                        <p:par>
-                          <p:cTn id="4" fill="hold">
-                            <p:stCondLst>
-                              <p:cond delay="0"/>
-                            </p:stCondLst>
-                            <p:childTnLst>
-                              <p:par>
-                                <p:cTn id="5" presetID="5" presetClass="entr" presetSubtype="10" fill="hold" grpId="0" nodeType="clickEffect">
-                                  <p:stCondLst>
-                                    <p:cond delay="0"/>
-                                  </p:stCondLst>
-                                  <p:childTnLst>
-                                    <p:set>
-                                      <p:cBhvr>
-                                        <p:cTn id="6" dur="1" fill="hold">
-                                          <p:stCondLst>
-                                            <p:cond delay="0"/>
-                                          </p:stCondLst>
-                                        </p:cTn>
-                                        <p:tgtEl>
-                                          <p:spTgt spid="5"/>
-                                        </p:tgtEl>
-                                        <p:attrNameLst>
-                                          <p:attrName>style.visibility</p:attrName>
-                                        </p:attrNameLst>
-                                      </p:cBhvr>
-                                      <p:to>
-                                        <p:strVal val="visible"/>
-                                      </p:to>
-                                    </p:set>
-                                    <p:animEffect transition="in" filter="checkerboard(across)">
-                                      <p:cBhvr>
-                                        <p:cTn id="7" dur="500"/>
-                                        <p:tgtEl>
-                                          <p:spTgt spid="5"/>
-                                        </p:tgtEl>
-                                      </p:cBhvr>
-                                    </p:animEffect>
-                                  </p:childTnLst>
-                                </p:cTn>
-                              </p:par>
-                              <p:par>
-                                <p:cTn id="8" presetID="5" presetClass="entr" presetSubtype="10" fill="hold" grpId="0" nodeType="withEffect">
-                                  <p:stCondLst>
-                                    <p:cond delay="0"/>
-                                  </p:stCondLst>
-                                  <p:childTnLst>
-                                    <p:set>
-                                      <p:cBhvr>
-                                        <p:cTn id="9" dur="1" fill="hold">
-                                          <p:stCondLst>
-                                            <p:cond delay="0"/>
-                                          </p:stCondLst>
-                                        </p:cTn>
-                                        <p:tgtEl>
-                                          <p:spTgt spid="8"/>
-                                        </p:tgtEl>
-                                        <p:attrNameLst>
-                                          <p:attrName>style.visibility</p:attrName>
-                                        </p:attrNameLst>
-                                      </p:cBhvr>
-                                      <p:to>
-                                        <p:strVal val="visible"/>
-                                      </p:to>
-                                    </p:set>
-                                    <p:animEffect transition="in" filter="checkerboard(across)">
-                                      <p:cBhvr>
-                                        <p:cTn id="10" dur="500"/>
-                                        <p:tgtEl>
-                                          <p:spTgt spid="8"/>
-                                        </p:tgtEl>
-                                      </p:cBhvr>
-                                    </p:animEffect>
-                                  </p:childTnLst>
-                                </p:cTn>
-                              </p:par>
-                              <p:par>
-                                <p:cTn id="11" presetID="5" presetClass="entr" presetSubtype="10" fill="hold" nodeType="withEffect">
-                                  <p:stCondLst>
-                                    <p:cond delay="0"/>
-                                  </p:stCondLst>
-                                  <p:childTnLst>
-                                    <p:set>
-                                      <p:cBhvr>
-                                        <p:cTn id="12" dur="1" fill="hold">
-                                          <p:stCondLst>
-                                            <p:cond delay="0"/>
-                                          </p:stCondLst>
-                                        </p:cTn>
-                                        <p:tgtEl>
-                                          <p:spTgt spid="10"/>
-                                        </p:tgtEl>
-                                        <p:attrNameLst>
-                                          <p:attrName>style.visibility</p:attrName>
-                                        </p:attrNameLst>
-                                      </p:cBhvr>
-                                      <p:to>
-                                        <p:strVal val="visible"/>
-                                      </p:to>
-                                    </p:set>
-                                    <p:animEffect transition="in" filter="checkerboard(across)">
-                                      <p:cBhvr>
-                                        <p:cTn id="13" dur="500"/>
-                                        <p:tgtEl>
-                                          <p:spTgt spid="10"/>
-                                        </p:tgtEl>
-                                      </p:cBhvr>
-                                    </p:animEffect>
-                                  </p:childTnLst>
-                                </p:cTn>
-                              </p:par>
-                              <p:par>
-                                <p:cTn id="14" presetID="5" presetClass="entr" presetSubtype="10" fill="hold" nodeType="withEffect">
-                                  <p:stCondLst>
-                                    <p:cond delay="0"/>
-                                  </p:stCondLst>
-                                  <p:childTnLst>
-                                    <p:set>
-                                      <p:cBhvr>
-                                        <p:cTn id="15" dur="1" fill="hold">
-                                          <p:stCondLst>
-                                            <p:cond delay="0"/>
-                                          </p:stCondLst>
-                                        </p:cTn>
-                                        <p:tgtEl>
-                                          <p:spTgt spid="7"/>
-                                        </p:tgtEl>
-                                        <p:attrNameLst>
-                                          <p:attrName>style.visibility</p:attrName>
-                                        </p:attrNameLst>
-                                      </p:cBhvr>
-                                      <p:to>
-                                        <p:strVal val="visible"/>
-                                      </p:to>
-                                    </p:set>
-                                    <p:animEffect transition="in" filter="checkerboard(across)">
-                                      <p:cBhvr>
-                                        <p:cTn id="16" dur="500"/>
-                                        <p:tgtEl>
-                                          <p:spTgt spid="7"/>
-                                        </p:tgtEl>
-                                      </p:cBhvr>
-                                    </p:animEffect>
-                                  </p:childTnLst>
-                                </p:cTn>
-                              </p:par>
-                              <p:par>
-                                <p:cTn id="17" presetID="5" presetClass="entr" presetSubtype="10" fill="hold" grpId="0" nodeType="withEffect">
-                                  <p:stCondLst>
-                                    <p:cond delay="0"/>
-                                  </p:stCondLst>
-                                  <p:childTnLst>
-                                    <p:set>
-                                      <p:cBhvr>
-                                        <p:cTn id="18" dur="1" fill="hold">
-                                          <p:stCondLst>
-                                            <p:cond delay="0"/>
-                                          </p:stCondLst>
-                                        </p:cTn>
-                                        <p:tgtEl>
-                                          <p:spTgt spid="11"/>
-                                        </p:tgtEl>
-                                        <p:attrNameLst>
-                                          <p:attrName>style.visibility</p:attrName>
-                                        </p:attrNameLst>
-                                      </p:cBhvr>
-                                      <p:to>
-                                        <p:strVal val="visible"/>
-                                      </p:to>
-                                    </p:set>
-                                    <p:animEffect transition="in" filter="checkerboard(across)">
-                                      <p:cBhvr>
-                                        <p:cTn id="19" dur="500"/>
-                                        <p:tgtEl>
-                                          <p:spTgt spid="11"/>
-                                        </p:tgtEl>
-                                      </p:cBhvr>
-                                    </p:animEffect>
-                                  </p:childTnLst>
-                                </p:cTn>
-                              </p:par>
-                            </p:childTnLst>
-                          </p:cTn>
-                        </p:par>
-                      </p:childTnLst>
-                    </p:cTn>
-                  </p:par>
-                </p:childTnLst>
-              </p:cTn>
-              <p:prevCondLst>
-                <p:cond evt="onPrev" delay="0">
-                  <p:tgtEl>
-                    <p:sldTgt/>
-                  </p:tgtEl>
-                </p:cond>
-              </p:prevCondLst>
-              <p:nextCondLst>
-                <p:cond evt="onNext" delay="0">
-                  <p:tgtEl>
-                    <p:sldTgt/>
-                  </p:tgtEl>
-                </p:cond>
-              </p:nextCondLst>
-            </p:seq>
-          </p:childTnLst>
-        </p:cTn>
-      </p:par>
-    </p:tnLst>
-    <p:bldLst>
-      <p:bldP spid="5" grpId="0"/>
-      <p:bldP spid="8" grpId="0"/>
-      <p:bldP spid="11" grpId="0"/>
-    </p:bldLst>
-  </p:timing>
 </p:sld>
 </file>
 
@@ -18019,7 +17728,7 @@
         </p:nvSpPr>
         <p:spPr>
           <a:xfrm>
-            <a:off x="1665044" y="3013503"/>
+            <a:off x="1717301" y="3018763"/>
             <a:ext cx="720069" cy="461665"/>
           </a:xfrm>
           <a:prstGeom prst="rect">
@@ -18258,7 +17967,7 @@
         </p:nvSpPr>
         <p:spPr>
           <a:xfrm>
-            <a:off x="1665044" y="4613318"/>
+            <a:off x="1665044" y="4613316"/>
             <a:ext cx="918841" cy="461665"/>
           </a:xfrm>
           <a:prstGeom prst="rect">
@@ -21441,7 +21150,7 @@
         </p:spPr>
         <p:txBody>
           <a:bodyPr>
-            <a:normAutofit fontScale="85000" lnSpcReduction="20000"/>
+            <a:normAutofit fontScale="85000" lnSpcReduction="10000"/>
           </a:bodyPr>
           <a:lstStyle/>
           <a:p>
@@ -21452,7 +21161,7 @@
             </a:pPr>
             <a:r>
               <a:rPr lang="en-IN" dirty="0"/>
-              <a:t>With advancement in technology, there is always a need of better ways to deal with network attacks</a:t>
+              <a:t>Fine tuning of different models could be done to improve performance</a:t>
             </a:r>
           </a:p>
           <a:p>

</xml_diff>